<commit_message>
Various updates and initial upload of lesson 11.
Updated the "DIY Battery" presentation in Lesson 1.
Updated the worksheet for Lesson 10.
Initial upload of Lesson 11.
</commit_message>
<xml_diff>
--- a/Lesson 1/DIY Battery.pptx
+++ b/Lesson 1/DIY Battery.pptx
@@ -18,8 +18,8 @@
     <p:sldId id="263" r:id="rId9"/>
     <p:sldId id="264" r:id="rId10"/>
   </p:sldIdLst>
-  <p:sldSz cx="9144000" cy="5143500" type="screen16x9"/>
-  <p:notesSz cx="6858000" cy="9144000"/>
+  <p:sldSz cx="9601200" cy="7315200"/>
+  <p:notesSz cx="7010400" cy="9296400"/>
   <p:defaultTextStyle>
     <a:defPPr marR="0" lvl="0" algn="l" rtl="0">
       <a:lnSpc>
@@ -46,7 +46,7 @@
         <a:srgbClr val="000000"/>
       </a:buClr>
       <a:buFont typeface="Arial"/>
-      <a:defRPr sz="1400" b="0" i="0" u="none" strike="noStrike" cap="none">
+      <a:defRPr sz="1500" b="0" i="0" u="none" strike="noStrike" cap="none">
         <a:solidFill>
           <a:srgbClr val="000000"/>
         </a:solidFill>
@@ -70,7 +70,7 @@
         <a:srgbClr val="000000"/>
       </a:buClr>
       <a:buFont typeface="Arial"/>
-      <a:defRPr sz="1400" b="0" i="0" u="none" strike="noStrike" cap="none">
+      <a:defRPr sz="1500" b="0" i="0" u="none" strike="noStrike" cap="none">
         <a:solidFill>
           <a:srgbClr val="000000"/>
         </a:solidFill>
@@ -94,7 +94,7 @@
         <a:srgbClr val="000000"/>
       </a:buClr>
       <a:buFont typeface="Arial"/>
-      <a:defRPr sz="1400" b="0" i="0" u="none" strike="noStrike" cap="none">
+      <a:defRPr sz="1500" b="0" i="0" u="none" strike="noStrike" cap="none">
         <a:solidFill>
           <a:srgbClr val="000000"/>
         </a:solidFill>
@@ -118,7 +118,7 @@
         <a:srgbClr val="000000"/>
       </a:buClr>
       <a:buFont typeface="Arial"/>
-      <a:defRPr sz="1400" b="0" i="0" u="none" strike="noStrike" cap="none">
+      <a:defRPr sz="1500" b="0" i="0" u="none" strike="noStrike" cap="none">
         <a:solidFill>
           <a:srgbClr val="000000"/>
         </a:solidFill>
@@ -142,7 +142,7 @@
         <a:srgbClr val="000000"/>
       </a:buClr>
       <a:buFont typeface="Arial"/>
-      <a:defRPr sz="1400" b="0" i="0" u="none" strike="noStrike" cap="none">
+      <a:defRPr sz="1500" b="0" i="0" u="none" strike="noStrike" cap="none">
         <a:solidFill>
           <a:srgbClr val="000000"/>
         </a:solidFill>
@@ -166,7 +166,7 @@
         <a:srgbClr val="000000"/>
       </a:buClr>
       <a:buFont typeface="Arial"/>
-      <a:defRPr sz="1400" b="0" i="0" u="none" strike="noStrike" cap="none">
+      <a:defRPr sz="1500" b="0" i="0" u="none" strike="noStrike" cap="none">
         <a:solidFill>
           <a:srgbClr val="000000"/>
         </a:solidFill>
@@ -190,7 +190,7 @@
         <a:srgbClr val="000000"/>
       </a:buClr>
       <a:buFont typeface="Arial"/>
-      <a:defRPr sz="1400" b="0" i="0" u="none" strike="noStrike" cap="none">
+      <a:defRPr sz="1500" b="0" i="0" u="none" strike="noStrike" cap="none">
         <a:solidFill>
           <a:srgbClr val="000000"/>
         </a:solidFill>
@@ -214,7 +214,7 @@
         <a:srgbClr val="000000"/>
       </a:buClr>
       <a:buFont typeface="Arial"/>
-      <a:defRPr sz="1400" b="0" i="0" u="none" strike="noStrike" cap="none">
+      <a:defRPr sz="1500" b="0" i="0" u="none" strike="noStrike" cap="none">
         <a:solidFill>
           <a:srgbClr val="000000"/>
         </a:solidFill>
@@ -238,7 +238,7 @@
         <a:srgbClr val="000000"/>
       </a:buClr>
       <a:buFont typeface="Arial"/>
-      <a:defRPr sz="1400" b="0" i="0" u="none" strike="noStrike" cap="none">
+      <a:defRPr sz="1500" b="0" i="0" u="none" strike="noStrike" cap="none">
         <a:solidFill>
           <a:srgbClr val="000000"/>
         </a:solidFill>
@@ -251,7 +251,7 @@
   </p:defaultTextStyle>
   <p:extLst>
     <p:ext uri="{EFAFB233-063F-42B5-8137-9DF3F51BA10A}">
-      <p15:sldGuideLst xmlns:p15="http://schemas.microsoft.com/office/powerpoint/2012/main">
+      <p15:sldGuideLst xmlns:p15="http://schemas.microsoft.com/office/powerpoint/2012/main" xmlns="">
         <p15:guide id="1" orient="horz" pos="1620">
           <p15:clr>
             <a:srgbClr val="A4A3A4"/>
@@ -302,8 +302,8 @@
         </p:nvSpPr>
         <p:spPr>
           <a:xfrm>
-            <a:off x="381300" y="685800"/>
-            <a:ext cx="6096075" cy="3429000"/>
+            <a:off x="1217613" y="696913"/>
+            <a:ext cx="4575175" cy="3487737"/>
           </a:xfrm>
           <a:custGeom>
             <a:avLst/>
@@ -353,8 +353,8 @@
         </p:nvSpPr>
         <p:spPr>
           <a:xfrm>
-            <a:off x="685800" y="4343400"/>
-            <a:ext cx="5486400" cy="4114800"/>
+            <a:off x="701041" y="4415790"/>
+            <a:ext cx="5608320" cy="4183380"/>
           </a:xfrm>
           <a:prstGeom prst="rect">
             <a:avLst/>
@@ -365,7 +365,7 @@
           </a:ln>
         </p:spPr>
         <p:txBody>
-          <a:bodyPr spcFirstLastPara="1" wrap="square" lIns="91425" tIns="91425" rIns="91425" bIns="91425" anchor="t" anchorCtr="0"/>
+          <a:bodyPr spcFirstLastPara="1" wrap="square" lIns="93152" tIns="93152" rIns="93152" bIns="93152" anchor="t" anchorCtr="0"/>
           <a:lstStyle>
             <a:lvl1pPr marL="457200" lvl="0" indent="-298450">
               <a:spcBef>
@@ -473,6 +473,11 @@
         </p:txBody>
       </p:sp>
     </p:spTree>
+    <p:extLst>
+      <p:ext uri="{BB962C8B-B14F-4D97-AF65-F5344CB8AC3E}">
+        <p14:creationId xmlns:p14="http://schemas.microsoft.com/office/powerpoint/2010/main" val="309246623"/>
+      </p:ext>
+    </p:extLst>
   </p:cSld>
   <p:clrMap bg1="lt1" tx1="dk1" bg2="dk2" tx2="lt2" accent1="accent1" accent2="accent2" accent3="accent3" accent4="accent4" accent5="accent5" accent6="accent6" hlink="hlink" folHlink="folHlink"/>
   <p:notesStyle>
@@ -501,7 +506,7 @@
         <a:srgbClr val="000000"/>
       </a:buClr>
       <a:buFont typeface="Arial"/>
-      <a:defRPr sz="1400" b="0" i="0" u="none" strike="noStrike" cap="none">
+      <a:defRPr sz="1500" b="0" i="0" u="none" strike="noStrike" cap="none">
         <a:solidFill>
           <a:srgbClr val="000000"/>
         </a:solidFill>
@@ -525,7 +530,7 @@
         <a:srgbClr val="000000"/>
       </a:buClr>
       <a:buFont typeface="Arial"/>
-      <a:defRPr sz="1400" b="0" i="0" u="none" strike="noStrike" cap="none">
+      <a:defRPr sz="1500" b="0" i="0" u="none" strike="noStrike" cap="none">
         <a:solidFill>
           <a:srgbClr val="000000"/>
         </a:solidFill>
@@ -549,7 +554,7 @@
         <a:srgbClr val="000000"/>
       </a:buClr>
       <a:buFont typeface="Arial"/>
-      <a:defRPr sz="1400" b="0" i="0" u="none" strike="noStrike" cap="none">
+      <a:defRPr sz="1500" b="0" i="0" u="none" strike="noStrike" cap="none">
         <a:solidFill>
           <a:srgbClr val="000000"/>
         </a:solidFill>
@@ -573,7 +578,7 @@
         <a:srgbClr val="000000"/>
       </a:buClr>
       <a:buFont typeface="Arial"/>
-      <a:defRPr sz="1400" b="0" i="0" u="none" strike="noStrike" cap="none">
+      <a:defRPr sz="1500" b="0" i="0" u="none" strike="noStrike" cap="none">
         <a:solidFill>
           <a:srgbClr val="000000"/>
         </a:solidFill>
@@ -597,7 +602,7 @@
         <a:srgbClr val="000000"/>
       </a:buClr>
       <a:buFont typeface="Arial"/>
-      <a:defRPr sz="1400" b="0" i="0" u="none" strike="noStrike" cap="none">
+      <a:defRPr sz="1500" b="0" i="0" u="none" strike="noStrike" cap="none">
         <a:solidFill>
           <a:srgbClr val="000000"/>
         </a:solidFill>
@@ -621,7 +626,7 @@
         <a:srgbClr val="000000"/>
       </a:buClr>
       <a:buFont typeface="Arial"/>
-      <a:defRPr sz="1400" b="0" i="0" u="none" strike="noStrike" cap="none">
+      <a:defRPr sz="1500" b="0" i="0" u="none" strike="noStrike" cap="none">
         <a:solidFill>
           <a:srgbClr val="000000"/>
         </a:solidFill>
@@ -645,7 +650,7 @@
         <a:srgbClr val="000000"/>
       </a:buClr>
       <a:buFont typeface="Arial"/>
-      <a:defRPr sz="1400" b="0" i="0" u="none" strike="noStrike" cap="none">
+      <a:defRPr sz="1500" b="0" i="0" u="none" strike="noStrike" cap="none">
         <a:solidFill>
           <a:srgbClr val="000000"/>
         </a:solidFill>
@@ -669,7 +674,7 @@
         <a:srgbClr val="000000"/>
       </a:buClr>
       <a:buFont typeface="Arial"/>
-      <a:defRPr sz="1400" b="0" i="0" u="none" strike="noStrike" cap="none">
+      <a:defRPr sz="1500" b="0" i="0" u="none" strike="noStrike" cap="none">
         <a:solidFill>
           <a:srgbClr val="000000"/>
         </a:solidFill>
@@ -693,7 +698,7 @@
         <a:srgbClr val="000000"/>
       </a:buClr>
       <a:buFont typeface="Arial"/>
-      <a:defRPr sz="1400" b="0" i="0" u="none" strike="noStrike" cap="none">
+      <a:defRPr sz="1500" b="0" i="0" u="none" strike="noStrike" cap="none">
         <a:solidFill>
           <a:srgbClr val="000000"/>
         </a:solidFill>
@@ -736,8 +741,8 @@
         </p:nvSpPr>
         <p:spPr>
           <a:xfrm>
-            <a:off x="381000" y="685800"/>
-            <a:ext cx="6096000" cy="3429000"/>
+            <a:off x="1217613" y="696913"/>
+            <a:ext cx="4575175" cy="3487737"/>
           </a:xfrm>
           <a:custGeom>
             <a:avLst/>
@@ -777,26 +782,20 @@
         </p:nvSpPr>
         <p:spPr>
           <a:xfrm>
-            <a:off x="685800" y="4343400"/>
-            <a:ext cx="5486400" cy="4114800"/>
+            <a:off x="701041" y="4415790"/>
+            <a:ext cx="5608320" cy="4183380"/>
           </a:xfrm>
           <a:prstGeom prst="rect">
             <a:avLst/>
           </a:prstGeom>
         </p:spPr>
         <p:txBody>
-          <a:bodyPr spcFirstLastPara="1" wrap="square" lIns="91425" tIns="91425" rIns="91425" bIns="91425" anchor="t" anchorCtr="0">
+          <a:bodyPr spcFirstLastPara="1" wrap="square" lIns="93152" tIns="93152" rIns="93152" bIns="93152" anchor="t" anchorCtr="0">
             <a:noAutofit/>
           </a:bodyPr>
           <a:lstStyle/>
           <a:p>
-            <a:pPr marL="0" lvl="0" indent="0">
-              <a:spcBef>
-                <a:spcPts val="0"/>
-              </a:spcBef>
-              <a:spcAft>
-                <a:spcPts val="0"/>
-              </a:spcAft>
+            <a:pPr marL="0" indent="0">
               <a:buNone/>
             </a:pPr>
             <a:endParaRPr/>
@@ -840,8 +839,8 @@
         </p:nvSpPr>
         <p:spPr>
           <a:xfrm>
-            <a:off x="381000" y="685800"/>
-            <a:ext cx="6096000" cy="3429000"/>
+            <a:off x="1217613" y="696913"/>
+            <a:ext cx="4575175" cy="3487737"/>
           </a:xfrm>
           <a:custGeom>
             <a:avLst/>
@@ -881,26 +880,20 @@
         </p:nvSpPr>
         <p:spPr>
           <a:xfrm>
-            <a:off x="685800" y="4343400"/>
-            <a:ext cx="5486400" cy="4114800"/>
+            <a:off x="701041" y="4415790"/>
+            <a:ext cx="5608320" cy="4183380"/>
           </a:xfrm>
           <a:prstGeom prst="rect">
             <a:avLst/>
           </a:prstGeom>
         </p:spPr>
         <p:txBody>
-          <a:bodyPr spcFirstLastPara="1" wrap="square" lIns="91425" tIns="91425" rIns="91425" bIns="91425" anchor="t" anchorCtr="0">
+          <a:bodyPr spcFirstLastPara="1" wrap="square" lIns="93152" tIns="93152" rIns="93152" bIns="93152" anchor="t" anchorCtr="0">
             <a:noAutofit/>
           </a:bodyPr>
           <a:lstStyle/>
           <a:p>
-            <a:pPr marL="0" lvl="0" indent="0">
-              <a:spcBef>
-                <a:spcPts val="0"/>
-              </a:spcBef>
-              <a:spcAft>
-                <a:spcPts val="0"/>
-              </a:spcAft>
+            <a:pPr marL="0" indent="0">
               <a:buNone/>
             </a:pPr>
             <a:endParaRPr/>
@@ -944,8 +937,8 @@
         </p:nvSpPr>
         <p:spPr>
           <a:xfrm>
-            <a:off x="381000" y="685800"/>
-            <a:ext cx="6096000" cy="3429000"/>
+            <a:off x="1217613" y="696913"/>
+            <a:ext cx="4575175" cy="3487737"/>
           </a:xfrm>
           <a:custGeom>
             <a:avLst/>
@@ -985,26 +978,20 @@
         </p:nvSpPr>
         <p:spPr>
           <a:xfrm>
-            <a:off x="685800" y="4343400"/>
-            <a:ext cx="5486400" cy="4114800"/>
+            <a:off x="701041" y="4415790"/>
+            <a:ext cx="5608320" cy="4183380"/>
           </a:xfrm>
           <a:prstGeom prst="rect">
             <a:avLst/>
           </a:prstGeom>
         </p:spPr>
         <p:txBody>
-          <a:bodyPr spcFirstLastPara="1" wrap="square" lIns="91425" tIns="91425" rIns="91425" bIns="91425" anchor="t" anchorCtr="0">
+          <a:bodyPr spcFirstLastPara="1" wrap="square" lIns="93152" tIns="93152" rIns="93152" bIns="93152" anchor="t" anchorCtr="0">
             <a:noAutofit/>
           </a:bodyPr>
           <a:lstStyle/>
           <a:p>
-            <a:pPr marL="0" lvl="0" indent="0">
-              <a:spcBef>
-                <a:spcPts val="0"/>
-              </a:spcBef>
-              <a:spcAft>
-                <a:spcPts val="0"/>
-              </a:spcAft>
+            <a:pPr marL="0" indent="0">
               <a:buNone/>
             </a:pPr>
             <a:endParaRPr/>
@@ -1048,8 +1035,8 @@
         </p:nvSpPr>
         <p:spPr>
           <a:xfrm>
-            <a:off x="381000" y="685800"/>
-            <a:ext cx="6096000" cy="3429000"/>
+            <a:off x="1217613" y="696913"/>
+            <a:ext cx="4575175" cy="3487737"/>
           </a:xfrm>
           <a:custGeom>
             <a:avLst/>
@@ -1089,26 +1076,20 @@
         </p:nvSpPr>
         <p:spPr>
           <a:xfrm>
-            <a:off x="685800" y="4343400"/>
-            <a:ext cx="5486400" cy="4114800"/>
+            <a:off x="701041" y="4415790"/>
+            <a:ext cx="5608320" cy="4183380"/>
           </a:xfrm>
           <a:prstGeom prst="rect">
             <a:avLst/>
           </a:prstGeom>
         </p:spPr>
         <p:txBody>
-          <a:bodyPr spcFirstLastPara="1" wrap="square" lIns="91425" tIns="91425" rIns="91425" bIns="91425" anchor="t" anchorCtr="0">
+          <a:bodyPr spcFirstLastPara="1" wrap="square" lIns="93152" tIns="93152" rIns="93152" bIns="93152" anchor="t" anchorCtr="0">
             <a:noAutofit/>
           </a:bodyPr>
           <a:lstStyle/>
           <a:p>
-            <a:pPr marL="0" lvl="0" indent="0">
-              <a:spcBef>
-                <a:spcPts val="0"/>
-              </a:spcBef>
-              <a:spcAft>
-                <a:spcPts val="0"/>
-              </a:spcAft>
+            <a:pPr marL="0" indent="0">
               <a:buNone/>
             </a:pPr>
             <a:endParaRPr/>
@@ -1152,8 +1133,8 @@
         </p:nvSpPr>
         <p:spPr>
           <a:xfrm>
-            <a:off x="381000" y="685800"/>
-            <a:ext cx="6096000" cy="3429000"/>
+            <a:off x="1217613" y="696913"/>
+            <a:ext cx="4575175" cy="3487737"/>
           </a:xfrm>
           <a:custGeom>
             <a:avLst/>
@@ -1193,26 +1174,20 @@
         </p:nvSpPr>
         <p:spPr>
           <a:xfrm>
-            <a:off x="685800" y="4343400"/>
-            <a:ext cx="5486400" cy="4114800"/>
+            <a:off x="701041" y="4415790"/>
+            <a:ext cx="5608320" cy="4183380"/>
           </a:xfrm>
           <a:prstGeom prst="rect">
             <a:avLst/>
           </a:prstGeom>
         </p:spPr>
         <p:txBody>
-          <a:bodyPr spcFirstLastPara="1" wrap="square" lIns="91425" tIns="91425" rIns="91425" bIns="91425" anchor="t" anchorCtr="0">
+          <a:bodyPr spcFirstLastPara="1" wrap="square" lIns="93152" tIns="93152" rIns="93152" bIns="93152" anchor="t" anchorCtr="0">
             <a:noAutofit/>
           </a:bodyPr>
           <a:lstStyle/>
           <a:p>
-            <a:pPr marL="0" lvl="0" indent="0">
-              <a:spcBef>
-                <a:spcPts val="0"/>
-              </a:spcBef>
-              <a:spcAft>
-                <a:spcPts val="0"/>
-              </a:spcAft>
+            <a:pPr marL="0" indent="0">
               <a:buNone/>
             </a:pPr>
             <a:endParaRPr/>
@@ -1256,8 +1231,8 @@
         </p:nvSpPr>
         <p:spPr>
           <a:xfrm>
-            <a:off x="381000" y="685800"/>
-            <a:ext cx="6096000" cy="3429000"/>
+            <a:off x="1217613" y="696913"/>
+            <a:ext cx="4575175" cy="3487737"/>
           </a:xfrm>
           <a:custGeom>
             <a:avLst/>
@@ -1297,26 +1272,20 @@
         </p:nvSpPr>
         <p:spPr>
           <a:xfrm>
-            <a:off x="685800" y="4343400"/>
-            <a:ext cx="5486400" cy="4114800"/>
+            <a:off x="701041" y="4415790"/>
+            <a:ext cx="5608320" cy="4183380"/>
           </a:xfrm>
           <a:prstGeom prst="rect">
             <a:avLst/>
           </a:prstGeom>
         </p:spPr>
         <p:txBody>
-          <a:bodyPr spcFirstLastPara="1" wrap="square" lIns="91425" tIns="91425" rIns="91425" bIns="91425" anchor="t" anchorCtr="0">
+          <a:bodyPr spcFirstLastPara="1" wrap="square" lIns="93152" tIns="93152" rIns="93152" bIns="93152" anchor="t" anchorCtr="0">
             <a:noAutofit/>
           </a:bodyPr>
           <a:lstStyle/>
           <a:p>
-            <a:pPr marL="0" lvl="0" indent="0">
-              <a:spcBef>
-                <a:spcPts val="0"/>
-              </a:spcBef>
-              <a:spcAft>
-                <a:spcPts val="0"/>
-              </a:spcAft>
+            <a:pPr marL="0" indent="0">
               <a:buNone/>
             </a:pPr>
             <a:endParaRPr/>
@@ -1360,8 +1329,8 @@
         </p:nvSpPr>
         <p:spPr>
           <a:xfrm>
-            <a:off x="381000" y="685800"/>
-            <a:ext cx="6096000" cy="3429000"/>
+            <a:off x="1217613" y="696913"/>
+            <a:ext cx="4575175" cy="3487737"/>
           </a:xfrm>
           <a:custGeom>
             <a:avLst/>
@@ -1401,26 +1370,20 @@
         </p:nvSpPr>
         <p:spPr>
           <a:xfrm>
-            <a:off x="685800" y="4343400"/>
-            <a:ext cx="5486400" cy="4114800"/>
+            <a:off x="701041" y="4415790"/>
+            <a:ext cx="5608320" cy="4183380"/>
           </a:xfrm>
           <a:prstGeom prst="rect">
             <a:avLst/>
           </a:prstGeom>
         </p:spPr>
         <p:txBody>
-          <a:bodyPr spcFirstLastPara="1" wrap="square" lIns="91425" tIns="91425" rIns="91425" bIns="91425" anchor="t" anchorCtr="0">
+          <a:bodyPr spcFirstLastPara="1" wrap="square" lIns="93152" tIns="93152" rIns="93152" bIns="93152" anchor="t" anchorCtr="0">
             <a:noAutofit/>
           </a:bodyPr>
           <a:lstStyle/>
           <a:p>
-            <a:pPr marL="0" lvl="0" indent="0">
-              <a:spcBef>
-                <a:spcPts val="0"/>
-              </a:spcBef>
-              <a:spcAft>
-                <a:spcPts val="0"/>
-              </a:spcAft>
+            <a:pPr marL="0" indent="0">
               <a:buNone/>
             </a:pPr>
             <a:endParaRPr/>
@@ -1464,8 +1427,8 @@
         </p:nvSpPr>
         <p:spPr>
           <a:xfrm>
-            <a:off x="381000" y="685800"/>
-            <a:ext cx="6096000" cy="3429000"/>
+            <a:off x="1217613" y="696913"/>
+            <a:ext cx="4575175" cy="3487737"/>
           </a:xfrm>
           <a:custGeom>
             <a:avLst/>
@@ -1505,26 +1468,20 @@
         </p:nvSpPr>
         <p:spPr>
           <a:xfrm>
-            <a:off x="685800" y="4343400"/>
-            <a:ext cx="5486400" cy="4114800"/>
+            <a:off x="701041" y="4415790"/>
+            <a:ext cx="5608320" cy="4183380"/>
           </a:xfrm>
           <a:prstGeom prst="rect">
             <a:avLst/>
           </a:prstGeom>
         </p:spPr>
         <p:txBody>
-          <a:bodyPr spcFirstLastPara="1" wrap="square" lIns="91425" tIns="91425" rIns="91425" bIns="91425" anchor="t" anchorCtr="0">
+          <a:bodyPr spcFirstLastPara="1" wrap="square" lIns="93152" tIns="93152" rIns="93152" bIns="93152" anchor="t" anchorCtr="0">
             <a:noAutofit/>
           </a:bodyPr>
           <a:lstStyle/>
           <a:p>
-            <a:pPr marL="0" lvl="0" indent="0">
-              <a:spcBef>
-                <a:spcPts val="0"/>
-              </a:spcBef>
-              <a:spcAft>
-                <a:spcPts val="0"/>
-              </a:spcAft>
+            <a:pPr marL="0" indent="0">
               <a:buNone/>
             </a:pPr>
             <a:endParaRPr/>
@@ -1568,8 +1525,8 @@
         </p:nvSpPr>
         <p:spPr>
           <a:xfrm>
-            <a:off x="381000" y="685800"/>
-            <a:ext cx="6096000" cy="3429000"/>
+            <a:off x="1217613" y="696913"/>
+            <a:ext cx="4575175" cy="3487737"/>
           </a:xfrm>
           <a:custGeom>
             <a:avLst/>
@@ -1609,26 +1566,20 @@
         </p:nvSpPr>
         <p:spPr>
           <a:xfrm>
-            <a:off x="685800" y="4343400"/>
-            <a:ext cx="5486400" cy="4114800"/>
+            <a:off x="701041" y="4415790"/>
+            <a:ext cx="5608320" cy="4183380"/>
           </a:xfrm>
           <a:prstGeom prst="rect">
             <a:avLst/>
           </a:prstGeom>
         </p:spPr>
         <p:txBody>
-          <a:bodyPr spcFirstLastPara="1" wrap="square" lIns="91425" tIns="91425" rIns="91425" bIns="91425" anchor="t" anchorCtr="0">
+          <a:bodyPr spcFirstLastPara="1" wrap="square" lIns="93152" tIns="93152" rIns="93152" bIns="93152" anchor="t" anchorCtr="0">
             <a:noAutofit/>
           </a:bodyPr>
           <a:lstStyle/>
           <a:p>
-            <a:pPr marL="0" lvl="0" indent="0">
-              <a:spcBef>
-                <a:spcPts val="0"/>
-              </a:spcBef>
-              <a:spcAft>
-                <a:spcPts val="0"/>
-              </a:spcAft>
+            <a:pPr marL="0" indent="0">
               <a:buNone/>
             </a:pPr>
             <a:endParaRPr/>
@@ -1672,15 +1623,15 @@
         </p:nvSpPr>
         <p:spPr>
           <a:xfrm>
-            <a:off x="311708" y="744575"/>
-            <a:ext cx="8520600" cy="2052600"/>
+            <a:off x="327293" y="1058952"/>
+            <a:ext cx="8946630" cy="2919253"/>
           </a:xfrm>
           <a:prstGeom prst="rect">
             <a:avLst/>
           </a:prstGeom>
         </p:spPr>
         <p:txBody>
-          <a:bodyPr spcFirstLastPara="1" wrap="square" lIns="91425" tIns="91425" rIns="91425" bIns="91425" anchor="b" anchorCtr="0"/>
+          <a:bodyPr spcFirstLastPara="1" wrap="square" lIns="96645" tIns="96645" rIns="96645" bIns="96645" anchor="b" anchorCtr="0"/>
           <a:lstStyle>
             <a:lvl1pPr lvl="0" algn="ctr">
               <a:spcBef>
@@ -1691,7 +1642,7 @@
               </a:spcAft>
               <a:buSzPts val="5200"/>
               <a:buNone/>
-              <a:defRPr sz="5200"/>
+              <a:defRPr sz="5500"/>
             </a:lvl1pPr>
             <a:lvl2pPr lvl="1" algn="ctr">
               <a:spcBef>
@@ -1702,7 +1653,7 @@
               </a:spcAft>
               <a:buSzPts val="5200"/>
               <a:buNone/>
-              <a:defRPr sz="5200"/>
+              <a:defRPr sz="5500"/>
             </a:lvl2pPr>
             <a:lvl3pPr lvl="2" algn="ctr">
               <a:spcBef>
@@ -1713,7 +1664,7 @@
               </a:spcAft>
               <a:buSzPts val="5200"/>
               <a:buNone/>
-              <a:defRPr sz="5200"/>
+              <a:defRPr sz="5500"/>
             </a:lvl3pPr>
             <a:lvl4pPr lvl="3" algn="ctr">
               <a:spcBef>
@@ -1724,7 +1675,7 @@
               </a:spcAft>
               <a:buSzPts val="5200"/>
               <a:buNone/>
-              <a:defRPr sz="5200"/>
+              <a:defRPr sz="5500"/>
             </a:lvl4pPr>
             <a:lvl5pPr lvl="4" algn="ctr">
               <a:spcBef>
@@ -1735,7 +1686,7 @@
               </a:spcAft>
               <a:buSzPts val="5200"/>
               <a:buNone/>
-              <a:defRPr sz="5200"/>
+              <a:defRPr sz="5500"/>
             </a:lvl5pPr>
             <a:lvl6pPr lvl="5" algn="ctr">
               <a:spcBef>
@@ -1746,7 +1697,7 @@
               </a:spcAft>
               <a:buSzPts val="5200"/>
               <a:buNone/>
-              <a:defRPr sz="5200"/>
+              <a:defRPr sz="5500"/>
             </a:lvl6pPr>
             <a:lvl7pPr lvl="6" algn="ctr">
               <a:spcBef>
@@ -1757,7 +1708,7 @@
               </a:spcAft>
               <a:buSzPts val="5200"/>
               <a:buNone/>
-              <a:defRPr sz="5200"/>
+              <a:defRPr sz="5500"/>
             </a:lvl7pPr>
             <a:lvl8pPr lvl="7" algn="ctr">
               <a:spcBef>
@@ -1768,7 +1719,7 @@
               </a:spcAft>
               <a:buSzPts val="5200"/>
               <a:buNone/>
-              <a:defRPr sz="5200"/>
+              <a:defRPr sz="5500"/>
             </a:lvl8pPr>
             <a:lvl9pPr lvl="8" algn="ctr">
               <a:spcBef>
@@ -1779,7 +1730,7 @@
               </a:spcAft>
               <a:buSzPts val="5200"/>
               <a:buNone/>
-              <a:defRPr sz="5200"/>
+              <a:defRPr sz="5500"/>
             </a:lvl9pPr>
           </a:lstStyle>
           <a:p>
@@ -1799,15 +1750,15 @@
         </p:nvSpPr>
         <p:spPr>
           <a:xfrm>
-            <a:off x="311700" y="2834125"/>
-            <a:ext cx="8520600" cy="792600"/>
+            <a:off x="327285" y="4030755"/>
+            <a:ext cx="8946630" cy="1127253"/>
           </a:xfrm>
           <a:prstGeom prst="rect">
             <a:avLst/>
           </a:prstGeom>
         </p:spPr>
         <p:txBody>
-          <a:bodyPr spcFirstLastPara="1" wrap="square" lIns="91425" tIns="91425" rIns="91425" bIns="91425" anchor="t" anchorCtr="0"/>
+          <a:bodyPr spcFirstLastPara="1" wrap="square" lIns="96645" tIns="96645" rIns="96645" bIns="96645" anchor="t" anchorCtr="0"/>
           <a:lstStyle>
             <a:lvl1pPr lvl="0" algn="ctr">
               <a:lnSpc>
@@ -1821,7 +1772,7 @@
               </a:spcAft>
               <a:buSzPts val="2800"/>
               <a:buNone/>
-              <a:defRPr sz="2800"/>
+              <a:defRPr sz="3000"/>
             </a:lvl1pPr>
             <a:lvl2pPr lvl="1" algn="ctr">
               <a:lnSpc>
@@ -1835,7 +1786,7 @@
               </a:spcAft>
               <a:buSzPts val="2800"/>
               <a:buNone/>
-              <a:defRPr sz="2800"/>
+              <a:defRPr sz="3000"/>
             </a:lvl2pPr>
             <a:lvl3pPr lvl="2" algn="ctr">
               <a:lnSpc>
@@ -1849,7 +1800,7 @@
               </a:spcAft>
               <a:buSzPts val="2800"/>
               <a:buNone/>
-              <a:defRPr sz="2800"/>
+              <a:defRPr sz="3000"/>
             </a:lvl3pPr>
             <a:lvl4pPr lvl="3" algn="ctr">
               <a:lnSpc>
@@ -1863,7 +1814,7 @@
               </a:spcAft>
               <a:buSzPts val="2800"/>
               <a:buNone/>
-              <a:defRPr sz="2800"/>
+              <a:defRPr sz="3000"/>
             </a:lvl4pPr>
             <a:lvl5pPr lvl="4" algn="ctr">
               <a:lnSpc>
@@ -1877,7 +1828,7 @@
               </a:spcAft>
               <a:buSzPts val="2800"/>
               <a:buNone/>
-              <a:defRPr sz="2800"/>
+              <a:defRPr sz="3000"/>
             </a:lvl5pPr>
             <a:lvl6pPr lvl="5" algn="ctr">
               <a:lnSpc>
@@ -1891,7 +1842,7 @@
               </a:spcAft>
               <a:buSzPts val="2800"/>
               <a:buNone/>
-              <a:defRPr sz="2800"/>
+              <a:defRPr sz="3000"/>
             </a:lvl6pPr>
             <a:lvl7pPr lvl="6" algn="ctr">
               <a:lnSpc>
@@ -1905,7 +1856,7 @@
               </a:spcAft>
               <a:buSzPts val="2800"/>
               <a:buNone/>
-              <a:defRPr sz="2800"/>
+              <a:defRPr sz="3000"/>
             </a:lvl7pPr>
             <a:lvl8pPr lvl="7" algn="ctr">
               <a:lnSpc>
@@ -1919,7 +1870,7 @@
               </a:spcAft>
               <a:buSzPts val="2800"/>
               <a:buNone/>
-              <a:defRPr sz="2800"/>
+              <a:defRPr sz="3000"/>
             </a:lvl8pPr>
             <a:lvl9pPr lvl="8" algn="ctr">
               <a:lnSpc>
@@ -1933,7 +1884,7 @@
               </a:spcAft>
               <a:buSzPts val="2800"/>
               <a:buNone/>
-              <a:defRPr sz="2800"/>
+              <a:defRPr sz="3000"/>
             </a:lvl9pPr>
           </a:lstStyle>
           <a:p>
@@ -1953,15 +1904,15 @@
         </p:nvSpPr>
         <p:spPr>
           <a:xfrm>
-            <a:off x="8472458" y="4663217"/>
-            <a:ext cx="548700" cy="393600"/>
+            <a:off x="8896081" y="6632131"/>
+            <a:ext cx="576135" cy="559787"/>
           </a:xfrm>
           <a:prstGeom prst="rect">
             <a:avLst/>
           </a:prstGeom>
         </p:spPr>
         <p:txBody>
-          <a:bodyPr spcFirstLastPara="1" wrap="square" lIns="91425" tIns="91425" rIns="91425" bIns="91425" anchor="ctr" anchorCtr="0">
+          <a:bodyPr spcFirstLastPara="1" wrap="square" lIns="96645" tIns="96645" rIns="96645" bIns="96645" anchor="ctr" anchorCtr="0">
             <a:noAutofit/>
           </a:bodyPr>
           <a:lstStyle>
@@ -2003,20 +1954,12 @@
             </a:lvl9pPr>
           </a:lstStyle>
           <a:p>
-            <a:pPr marL="0" lvl="0" indent="0">
-              <a:spcBef>
-                <a:spcPts val="0"/>
-              </a:spcBef>
-              <a:spcAft>
-                <a:spcPts val="0"/>
-              </a:spcAft>
-              <a:buNone/>
-            </a:pPr>
             <a:fld id="{00000000-1234-1234-1234-123412341234}" type="slidenum">
-              <a:rPr lang="en"/>
+              <a:rPr lang="en" smtClean="0"/>
+              <a:pPr/>
               <a:t>‹#›</a:t>
             </a:fld>
-            <a:endParaRPr/>
+            <a:endParaRPr lang="en"/>
           </a:p>
         </p:txBody>
       </p:sp>
@@ -2057,15 +2000,15 @@
         </p:nvSpPr>
         <p:spPr>
           <a:xfrm>
-            <a:off x="311700" y="1106125"/>
-            <a:ext cx="8520600" cy="1963500"/>
+            <a:off x="327285" y="1573155"/>
+            <a:ext cx="8946630" cy="2792533"/>
           </a:xfrm>
           <a:prstGeom prst="rect">
             <a:avLst/>
           </a:prstGeom>
         </p:spPr>
         <p:txBody>
-          <a:bodyPr spcFirstLastPara="1" wrap="square" lIns="91425" tIns="91425" rIns="91425" bIns="91425" anchor="b" anchorCtr="0"/>
+          <a:bodyPr spcFirstLastPara="1" wrap="square" lIns="96645" tIns="96645" rIns="96645" bIns="96645" anchor="b" anchorCtr="0"/>
           <a:lstStyle>
             <a:lvl1pPr lvl="0" algn="ctr">
               <a:spcBef>
@@ -2076,7 +2019,7 @@
               </a:spcAft>
               <a:buSzPts val="12000"/>
               <a:buNone/>
-              <a:defRPr sz="12000"/>
+              <a:defRPr sz="12700"/>
             </a:lvl1pPr>
             <a:lvl2pPr lvl="1" algn="ctr">
               <a:spcBef>
@@ -2087,7 +2030,7 @@
               </a:spcAft>
               <a:buSzPts val="12000"/>
               <a:buNone/>
-              <a:defRPr sz="12000"/>
+              <a:defRPr sz="12700"/>
             </a:lvl2pPr>
             <a:lvl3pPr lvl="2" algn="ctr">
               <a:spcBef>
@@ -2098,7 +2041,7 @@
               </a:spcAft>
               <a:buSzPts val="12000"/>
               <a:buNone/>
-              <a:defRPr sz="12000"/>
+              <a:defRPr sz="12700"/>
             </a:lvl3pPr>
             <a:lvl4pPr lvl="3" algn="ctr">
               <a:spcBef>
@@ -2109,7 +2052,7 @@
               </a:spcAft>
               <a:buSzPts val="12000"/>
               <a:buNone/>
-              <a:defRPr sz="12000"/>
+              <a:defRPr sz="12700"/>
             </a:lvl4pPr>
             <a:lvl5pPr lvl="4" algn="ctr">
               <a:spcBef>
@@ -2120,7 +2063,7 @@
               </a:spcAft>
               <a:buSzPts val="12000"/>
               <a:buNone/>
-              <a:defRPr sz="12000"/>
+              <a:defRPr sz="12700"/>
             </a:lvl5pPr>
             <a:lvl6pPr lvl="5" algn="ctr">
               <a:spcBef>
@@ -2131,7 +2074,7 @@
               </a:spcAft>
               <a:buSzPts val="12000"/>
               <a:buNone/>
-              <a:defRPr sz="12000"/>
+              <a:defRPr sz="12700"/>
             </a:lvl6pPr>
             <a:lvl7pPr lvl="6" algn="ctr">
               <a:spcBef>
@@ -2142,7 +2085,7 @@
               </a:spcAft>
               <a:buSzPts val="12000"/>
               <a:buNone/>
-              <a:defRPr sz="12000"/>
+              <a:defRPr sz="12700"/>
             </a:lvl7pPr>
             <a:lvl8pPr lvl="7" algn="ctr">
               <a:spcBef>
@@ -2153,7 +2096,7 @@
               </a:spcAft>
               <a:buSzPts val="12000"/>
               <a:buNone/>
-              <a:defRPr sz="12000"/>
+              <a:defRPr sz="12700"/>
             </a:lvl8pPr>
             <a:lvl9pPr lvl="8" algn="ctr">
               <a:spcBef>
@@ -2164,7 +2107,7 @@
               </a:spcAft>
               <a:buSzPts val="12000"/>
               <a:buNone/>
-              <a:defRPr sz="12000"/>
+              <a:defRPr sz="12700"/>
             </a:lvl9pPr>
           </a:lstStyle>
           <a:p>
@@ -2186,17 +2129,17 @@
         </p:nvSpPr>
         <p:spPr>
           <a:xfrm>
-            <a:off x="311700" y="3152225"/>
-            <a:ext cx="8520600" cy="1300800"/>
+            <a:off x="327285" y="4483165"/>
+            <a:ext cx="8946630" cy="1850027"/>
           </a:xfrm>
           <a:prstGeom prst="rect">
             <a:avLst/>
           </a:prstGeom>
         </p:spPr>
         <p:txBody>
-          <a:bodyPr spcFirstLastPara="1" wrap="square" lIns="91425" tIns="91425" rIns="91425" bIns="91425" anchor="t" anchorCtr="0"/>
+          <a:bodyPr spcFirstLastPara="1" wrap="square" lIns="96645" tIns="96645" rIns="96645" bIns="96645" anchor="t" anchorCtr="0"/>
           <a:lstStyle>
-            <a:lvl1pPr marL="457200" lvl="0" indent="-342900" algn="ctr">
+            <a:lvl1pPr marL="483306" lvl="0" indent="-362480" algn="ctr">
               <a:spcBef>
                 <a:spcPts val="0"/>
               </a:spcBef>
@@ -2207,9 +2150,9 @@
               <a:buChar char="●"/>
               <a:defRPr/>
             </a:lvl1pPr>
-            <a:lvl2pPr marL="914400" lvl="1" indent="-317500" algn="ctr">
-              <a:spcBef>
-                <a:spcPts val="1600"/>
+            <a:lvl2pPr marL="966612" lvl="1" indent="-335629" algn="ctr">
+              <a:spcBef>
+                <a:spcPts val="1691"/>
               </a:spcBef>
               <a:spcAft>
                 <a:spcPts val="0"/>
@@ -2218,9 +2161,9 @@
               <a:buChar char="○"/>
               <a:defRPr/>
             </a:lvl2pPr>
-            <a:lvl3pPr marL="1371600" lvl="2" indent="-317500" algn="ctr">
-              <a:spcBef>
-                <a:spcPts val="1600"/>
+            <a:lvl3pPr marL="1449918" lvl="2" indent="-335629" algn="ctr">
+              <a:spcBef>
+                <a:spcPts val="1691"/>
               </a:spcBef>
               <a:spcAft>
                 <a:spcPts val="0"/>
@@ -2229,9 +2172,9 @@
               <a:buChar char="■"/>
               <a:defRPr/>
             </a:lvl3pPr>
-            <a:lvl4pPr marL="1828800" lvl="3" indent="-317500" algn="ctr">
-              <a:spcBef>
-                <a:spcPts val="1600"/>
+            <a:lvl4pPr marL="1933224" lvl="3" indent="-335629" algn="ctr">
+              <a:spcBef>
+                <a:spcPts val="1691"/>
               </a:spcBef>
               <a:spcAft>
                 <a:spcPts val="0"/>
@@ -2240,9 +2183,9 @@
               <a:buChar char="●"/>
               <a:defRPr/>
             </a:lvl4pPr>
-            <a:lvl5pPr marL="2286000" lvl="4" indent="-317500" algn="ctr">
-              <a:spcBef>
-                <a:spcPts val="1600"/>
+            <a:lvl5pPr marL="2416531" lvl="4" indent="-335629" algn="ctr">
+              <a:spcBef>
+                <a:spcPts val="1691"/>
               </a:spcBef>
               <a:spcAft>
                 <a:spcPts val="0"/>
@@ -2251,9 +2194,9 @@
               <a:buChar char="○"/>
               <a:defRPr/>
             </a:lvl5pPr>
-            <a:lvl6pPr marL="2743200" lvl="5" indent="-317500" algn="ctr">
-              <a:spcBef>
-                <a:spcPts val="1600"/>
+            <a:lvl6pPr marL="2899837" lvl="5" indent="-335629" algn="ctr">
+              <a:spcBef>
+                <a:spcPts val="1691"/>
               </a:spcBef>
               <a:spcAft>
                 <a:spcPts val="0"/>
@@ -2262,9 +2205,9 @@
               <a:buChar char="■"/>
               <a:defRPr/>
             </a:lvl6pPr>
-            <a:lvl7pPr marL="3200400" lvl="6" indent="-317500" algn="ctr">
-              <a:spcBef>
-                <a:spcPts val="1600"/>
+            <a:lvl7pPr marL="3383143" lvl="6" indent="-335629" algn="ctr">
+              <a:spcBef>
+                <a:spcPts val="1691"/>
               </a:spcBef>
               <a:spcAft>
                 <a:spcPts val="0"/>
@@ -2273,9 +2216,9 @@
               <a:buChar char="●"/>
               <a:defRPr/>
             </a:lvl7pPr>
-            <a:lvl8pPr marL="3657600" lvl="7" indent="-317500" algn="ctr">
-              <a:spcBef>
-                <a:spcPts val="1600"/>
+            <a:lvl8pPr marL="3866449" lvl="7" indent="-335629" algn="ctr">
+              <a:spcBef>
+                <a:spcPts val="1691"/>
               </a:spcBef>
               <a:spcAft>
                 <a:spcPts val="0"/>
@@ -2284,12 +2227,12 @@
               <a:buChar char="○"/>
               <a:defRPr/>
             </a:lvl8pPr>
-            <a:lvl9pPr marL="4114800" lvl="8" indent="-317500" algn="ctr">
-              <a:spcBef>
-                <a:spcPts val="1600"/>
-              </a:spcBef>
-              <a:spcAft>
-                <a:spcPts val="1600"/>
+            <a:lvl9pPr marL="4349755" lvl="8" indent="-335629" algn="ctr">
+              <a:spcBef>
+                <a:spcPts val="1691"/>
+              </a:spcBef>
+              <a:spcAft>
+                <a:spcPts val="1691"/>
               </a:spcAft>
               <a:buSzPts val="1400"/>
               <a:buChar char="■"/>
@@ -2313,15 +2256,15 @@
         </p:nvSpPr>
         <p:spPr>
           <a:xfrm>
-            <a:off x="8472458" y="4663217"/>
-            <a:ext cx="548700" cy="393600"/>
+            <a:off x="8896081" y="6632131"/>
+            <a:ext cx="576135" cy="559787"/>
           </a:xfrm>
           <a:prstGeom prst="rect">
             <a:avLst/>
           </a:prstGeom>
         </p:spPr>
         <p:txBody>
-          <a:bodyPr spcFirstLastPara="1" wrap="square" lIns="91425" tIns="91425" rIns="91425" bIns="91425" anchor="ctr" anchorCtr="0">
+          <a:bodyPr spcFirstLastPara="1" wrap="square" lIns="96645" tIns="96645" rIns="96645" bIns="96645" anchor="ctr" anchorCtr="0">
             <a:noAutofit/>
           </a:bodyPr>
           <a:lstStyle>
@@ -2363,20 +2306,12 @@
             </a:lvl9pPr>
           </a:lstStyle>
           <a:p>
-            <a:pPr marL="0" lvl="0" indent="0">
-              <a:spcBef>
-                <a:spcPts val="0"/>
-              </a:spcBef>
-              <a:spcAft>
-                <a:spcPts val="0"/>
-              </a:spcAft>
-              <a:buNone/>
-            </a:pPr>
             <a:fld id="{00000000-1234-1234-1234-123412341234}" type="slidenum">
-              <a:rPr lang="en"/>
+              <a:rPr lang="en" smtClean="0"/>
+              <a:pPr/>
               <a:t>‹#›</a:t>
             </a:fld>
-            <a:endParaRPr/>
+            <a:endParaRPr lang="en"/>
           </a:p>
         </p:txBody>
       </p:sp>
@@ -2417,15 +2352,15 @@
         </p:nvSpPr>
         <p:spPr>
           <a:xfrm>
-            <a:off x="8472458" y="4663217"/>
-            <a:ext cx="548700" cy="393600"/>
+            <a:off x="8896081" y="6632131"/>
+            <a:ext cx="576135" cy="559787"/>
           </a:xfrm>
           <a:prstGeom prst="rect">
             <a:avLst/>
           </a:prstGeom>
         </p:spPr>
         <p:txBody>
-          <a:bodyPr spcFirstLastPara="1" wrap="square" lIns="91425" tIns="91425" rIns="91425" bIns="91425" anchor="ctr" anchorCtr="0">
+          <a:bodyPr spcFirstLastPara="1" wrap="square" lIns="96645" tIns="96645" rIns="96645" bIns="96645" anchor="ctr" anchorCtr="0">
             <a:noAutofit/>
           </a:bodyPr>
           <a:lstStyle>
@@ -2467,20 +2402,12 @@
             </a:lvl9pPr>
           </a:lstStyle>
           <a:p>
-            <a:pPr marL="0" lvl="0" indent="0">
-              <a:spcBef>
-                <a:spcPts val="0"/>
-              </a:spcBef>
-              <a:spcAft>
-                <a:spcPts val="0"/>
-              </a:spcAft>
-              <a:buNone/>
-            </a:pPr>
             <a:fld id="{00000000-1234-1234-1234-123412341234}" type="slidenum">
-              <a:rPr lang="en"/>
+              <a:rPr lang="en" smtClean="0"/>
+              <a:pPr/>
               <a:t>‹#›</a:t>
             </a:fld>
-            <a:endParaRPr/>
+            <a:endParaRPr lang="en"/>
           </a:p>
         </p:txBody>
       </p:sp>
@@ -2521,15 +2448,15 @@
         </p:nvSpPr>
         <p:spPr>
           <a:xfrm>
-            <a:off x="311700" y="2150850"/>
-            <a:ext cx="8520600" cy="841800"/>
+            <a:off x="327285" y="3058987"/>
+            <a:ext cx="8946630" cy="1197227"/>
           </a:xfrm>
           <a:prstGeom prst="rect">
             <a:avLst/>
           </a:prstGeom>
         </p:spPr>
         <p:txBody>
-          <a:bodyPr spcFirstLastPara="1" wrap="square" lIns="91425" tIns="91425" rIns="91425" bIns="91425" anchor="ctr" anchorCtr="0"/>
+          <a:bodyPr spcFirstLastPara="1" wrap="square" lIns="96645" tIns="96645" rIns="96645" bIns="96645" anchor="ctr" anchorCtr="0"/>
           <a:lstStyle>
             <a:lvl1pPr lvl="0" algn="ctr">
               <a:spcBef>
@@ -2540,7 +2467,7 @@
               </a:spcAft>
               <a:buSzPts val="3600"/>
               <a:buNone/>
-              <a:defRPr sz="3600"/>
+              <a:defRPr sz="3800"/>
             </a:lvl1pPr>
             <a:lvl2pPr lvl="1" algn="ctr">
               <a:spcBef>
@@ -2551,7 +2478,7 @@
               </a:spcAft>
               <a:buSzPts val="3600"/>
               <a:buNone/>
-              <a:defRPr sz="3600"/>
+              <a:defRPr sz="3800"/>
             </a:lvl2pPr>
             <a:lvl3pPr lvl="2" algn="ctr">
               <a:spcBef>
@@ -2562,7 +2489,7 @@
               </a:spcAft>
               <a:buSzPts val="3600"/>
               <a:buNone/>
-              <a:defRPr sz="3600"/>
+              <a:defRPr sz="3800"/>
             </a:lvl3pPr>
             <a:lvl4pPr lvl="3" algn="ctr">
               <a:spcBef>
@@ -2573,7 +2500,7 @@
               </a:spcAft>
               <a:buSzPts val="3600"/>
               <a:buNone/>
-              <a:defRPr sz="3600"/>
+              <a:defRPr sz="3800"/>
             </a:lvl4pPr>
             <a:lvl5pPr lvl="4" algn="ctr">
               <a:spcBef>
@@ -2584,7 +2511,7 @@
               </a:spcAft>
               <a:buSzPts val="3600"/>
               <a:buNone/>
-              <a:defRPr sz="3600"/>
+              <a:defRPr sz="3800"/>
             </a:lvl5pPr>
             <a:lvl6pPr lvl="5" algn="ctr">
               <a:spcBef>
@@ -2595,7 +2522,7 @@
               </a:spcAft>
               <a:buSzPts val="3600"/>
               <a:buNone/>
-              <a:defRPr sz="3600"/>
+              <a:defRPr sz="3800"/>
             </a:lvl6pPr>
             <a:lvl7pPr lvl="6" algn="ctr">
               <a:spcBef>
@@ -2606,7 +2533,7 @@
               </a:spcAft>
               <a:buSzPts val="3600"/>
               <a:buNone/>
-              <a:defRPr sz="3600"/>
+              <a:defRPr sz="3800"/>
             </a:lvl7pPr>
             <a:lvl8pPr lvl="7" algn="ctr">
               <a:spcBef>
@@ -2617,7 +2544,7 @@
               </a:spcAft>
               <a:buSzPts val="3600"/>
               <a:buNone/>
-              <a:defRPr sz="3600"/>
+              <a:defRPr sz="3800"/>
             </a:lvl8pPr>
             <a:lvl9pPr lvl="8" algn="ctr">
               <a:spcBef>
@@ -2628,7 +2555,7 @@
               </a:spcAft>
               <a:buSzPts val="3600"/>
               <a:buNone/>
-              <a:defRPr sz="3600"/>
+              <a:defRPr sz="3800"/>
             </a:lvl9pPr>
           </a:lstStyle>
           <a:p>
@@ -2648,15 +2575,15 @@
         </p:nvSpPr>
         <p:spPr>
           <a:xfrm>
-            <a:off x="8472458" y="4663217"/>
-            <a:ext cx="548700" cy="393600"/>
+            <a:off x="8896081" y="6632131"/>
+            <a:ext cx="576135" cy="559787"/>
           </a:xfrm>
           <a:prstGeom prst="rect">
             <a:avLst/>
           </a:prstGeom>
         </p:spPr>
         <p:txBody>
-          <a:bodyPr spcFirstLastPara="1" wrap="square" lIns="91425" tIns="91425" rIns="91425" bIns="91425" anchor="ctr" anchorCtr="0">
+          <a:bodyPr spcFirstLastPara="1" wrap="square" lIns="96645" tIns="96645" rIns="96645" bIns="96645" anchor="ctr" anchorCtr="0">
             <a:noAutofit/>
           </a:bodyPr>
           <a:lstStyle>
@@ -2698,20 +2625,12 @@
             </a:lvl9pPr>
           </a:lstStyle>
           <a:p>
-            <a:pPr marL="0" lvl="0" indent="0">
-              <a:spcBef>
-                <a:spcPts val="0"/>
-              </a:spcBef>
-              <a:spcAft>
-                <a:spcPts val="0"/>
-              </a:spcAft>
-              <a:buNone/>
-            </a:pPr>
             <a:fld id="{00000000-1234-1234-1234-123412341234}" type="slidenum">
-              <a:rPr lang="en"/>
+              <a:rPr lang="en" smtClean="0"/>
+              <a:pPr/>
               <a:t>‹#›</a:t>
             </a:fld>
-            <a:endParaRPr/>
+            <a:endParaRPr lang="en"/>
           </a:p>
         </p:txBody>
       </p:sp>
@@ -2752,15 +2671,15 @@
         </p:nvSpPr>
         <p:spPr>
           <a:xfrm>
-            <a:off x="311700" y="445025"/>
-            <a:ext cx="8520600" cy="572700"/>
+            <a:off x="327285" y="632925"/>
+            <a:ext cx="8946630" cy="814507"/>
           </a:xfrm>
           <a:prstGeom prst="rect">
             <a:avLst/>
           </a:prstGeom>
         </p:spPr>
         <p:txBody>
-          <a:bodyPr spcFirstLastPara="1" wrap="square" lIns="91425" tIns="91425" rIns="91425" bIns="91425" anchor="t" anchorCtr="0"/>
+          <a:bodyPr spcFirstLastPara="1" wrap="square" lIns="96645" tIns="96645" rIns="96645" bIns="96645" anchor="t" anchorCtr="0"/>
           <a:lstStyle>
             <a:lvl1pPr lvl="0">
               <a:spcBef>
@@ -2879,17 +2798,17 @@
         </p:nvSpPr>
         <p:spPr>
           <a:xfrm>
-            <a:off x="311700" y="1152475"/>
-            <a:ext cx="8520600" cy="3416400"/>
+            <a:off x="327285" y="1639075"/>
+            <a:ext cx="8946630" cy="4858880"/>
           </a:xfrm>
           <a:prstGeom prst="rect">
             <a:avLst/>
           </a:prstGeom>
         </p:spPr>
         <p:txBody>
-          <a:bodyPr spcFirstLastPara="1" wrap="square" lIns="91425" tIns="91425" rIns="91425" bIns="91425" anchor="t" anchorCtr="0"/>
+          <a:bodyPr spcFirstLastPara="1" wrap="square" lIns="96645" tIns="96645" rIns="96645" bIns="96645" anchor="t" anchorCtr="0"/>
           <a:lstStyle>
-            <a:lvl1pPr marL="457200" lvl="0" indent="-342900">
+            <a:lvl1pPr marL="483306" lvl="0" indent="-362480">
               <a:spcBef>
                 <a:spcPts val="0"/>
               </a:spcBef>
@@ -2900,9 +2819,9 @@
               <a:buChar char="●"/>
               <a:defRPr/>
             </a:lvl1pPr>
-            <a:lvl2pPr marL="914400" lvl="1" indent="-317500">
-              <a:spcBef>
-                <a:spcPts val="1600"/>
+            <a:lvl2pPr marL="966612" lvl="1" indent="-335629">
+              <a:spcBef>
+                <a:spcPts val="1691"/>
               </a:spcBef>
               <a:spcAft>
                 <a:spcPts val="0"/>
@@ -2911,9 +2830,9 @@
               <a:buChar char="○"/>
               <a:defRPr/>
             </a:lvl2pPr>
-            <a:lvl3pPr marL="1371600" lvl="2" indent="-317500">
-              <a:spcBef>
-                <a:spcPts val="1600"/>
+            <a:lvl3pPr marL="1449918" lvl="2" indent="-335629">
+              <a:spcBef>
+                <a:spcPts val="1691"/>
               </a:spcBef>
               <a:spcAft>
                 <a:spcPts val="0"/>
@@ -2922,9 +2841,9 @@
               <a:buChar char="■"/>
               <a:defRPr/>
             </a:lvl3pPr>
-            <a:lvl4pPr marL="1828800" lvl="3" indent="-317500">
-              <a:spcBef>
-                <a:spcPts val="1600"/>
+            <a:lvl4pPr marL="1933224" lvl="3" indent="-335629">
+              <a:spcBef>
+                <a:spcPts val="1691"/>
               </a:spcBef>
               <a:spcAft>
                 <a:spcPts val="0"/>
@@ -2933,9 +2852,9 @@
               <a:buChar char="●"/>
               <a:defRPr/>
             </a:lvl4pPr>
-            <a:lvl5pPr marL="2286000" lvl="4" indent="-317500">
-              <a:spcBef>
-                <a:spcPts val="1600"/>
+            <a:lvl5pPr marL="2416531" lvl="4" indent="-335629">
+              <a:spcBef>
+                <a:spcPts val="1691"/>
               </a:spcBef>
               <a:spcAft>
                 <a:spcPts val="0"/>
@@ -2944,9 +2863,9 @@
               <a:buChar char="○"/>
               <a:defRPr/>
             </a:lvl5pPr>
-            <a:lvl6pPr marL="2743200" lvl="5" indent="-317500">
-              <a:spcBef>
-                <a:spcPts val="1600"/>
+            <a:lvl6pPr marL="2899837" lvl="5" indent="-335629">
+              <a:spcBef>
+                <a:spcPts val="1691"/>
               </a:spcBef>
               <a:spcAft>
                 <a:spcPts val="0"/>
@@ -2955,9 +2874,9 @@
               <a:buChar char="■"/>
               <a:defRPr/>
             </a:lvl6pPr>
-            <a:lvl7pPr marL="3200400" lvl="6" indent="-317500">
-              <a:spcBef>
-                <a:spcPts val="1600"/>
+            <a:lvl7pPr marL="3383143" lvl="6" indent="-335629">
+              <a:spcBef>
+                <a:spcPts val="1691"/>
               </a:spcBef>
               <a:spcAft>
                 <a:spcPts val="0"/>
@@ -2966,9 +2885,9 @@
               <a:buChar char="●"/>
               <a:defRPr/>
             </a:lvl7pPr>
-            <a:lvl8pPr marL="3657600" lvl="7" indent="-317500">
-              <a:spcBef>
-                <a:spcPts val="1600"/>
+            <a:lvl8pPr marL="3866449" lvl="7" indent="-335629">
+              <a:spcBef>
+                <a:spcPts val="1691"/>
               </a:spcBef>
               <a:spcAft>
                 <a:spcPts val="0"/>
@@ -2977,12 +2896,12 @@
               <a:buChar char="○"/>
               <a:defRPr/>
             </a:lvl8pPr>
-            <a:lvl9pPr marL="4114800" lvl="8" indent="-317500">
-              <a:spcBef>
-                <a:spcPts val="1600"/>
-              </a:spcBef>
-              <a:spcAft>
-                <a:spcPts val="1600"/>
+            <a:lvl9pPr marL="4349755" lvl="8" indent="-335629">
+              <a:spcBef>
+                <a:spcPts val="1691"/>
+              </a:spcBef>
+              <a:spcAft>
+                <a:spcPts val="1691"/>
               </a:spcAft>
               <a:buSzPts val="1400"/>
               <a:buChar char="■"/>
@@ -3006,15 +2925,15 @@
         </p:nvSpPr>
         <p:spPr>
           <a:xfrm>
-            <a:off x="8472458" y="4663217"/>
-            <a:ext cx="548700" cy="393600"/>
+            <a:off x="8896081" y="6632131"/>
+            <a:ext cx="576135" cy="559787"/>
           </a:xfrm>
           <a:prstGeom prst="rect">
             <a:avLst/>
           </a:prstGeom>
         </p:spPr>
         <p:txBody>
-          <a:bodyPr spcFirstLastPara="1" wrap="square" lIns="91425" tIns="91425" rIns="91425" bIns="91425" anchor="ctr" anchorCtr="0">
+          <a:bodyPr spcFirstLastPara="1" wrap="square" lIns="96645" tIns="96645" rIns="96645" bIns="96645" anchor="ctr" anchorCtr="0">
             <a:noAutofit/>
           </a:bodyPr>
           <a:lstStyle>
@@ -3056,20 +2975,12 @@
             </a:lvl9pPr>
           </a:lstStyle>
           <a:p>
-            <a:pPr marL="0" lvl="0" indent="0">
-              <a:spcBef>
-                <a:spcPts val="0"/>
-              </a:spcBef>
-              <a:spcAft>
-                <a:spcPts val="0"/>
-              </a:spcAft>
-              <a:buNone/>
-            </a:pPr>
             <a:fld id="{00000000-1234-1234-1234-123412341234}" type="slidenum">
-              <a:rPr lang="en"/>
+              <a:rPr lang="en" smtClean="0"/>
+              <a:pPr/>
               <a:t>‹#›</a:t>
             </a:fld>
-            <a:endParaRPr/>
+            <a:endParaRPr lang="en"/>
           </a:p>
         </p:txBody>
       </p:sp>
@@ -3110,15 +3021,15 @@
         </p:nvSpPr>
         <p:spPr>
           <a:xfrm>
-            <a:off x="311700" y="445025"/>
-            <a:ext cx="8520600" cy="572700"/>
+            <a:off x="327285" y="632925"/>
+            <a:ext cx="8946630" cy="814507"/>
           </a:xfrm>
           <a:prstGeom prst="rect">
             <a:avLst/>
           </a:prstGeom>
         </p:spPr>
         <p:txBody>
-          <a:bodyPr spcFirstLastPara="1" wrap="square" lIns="91425" tIns="91425" rIns="91425" bIns="91425" anchor="t" anchorCtr="0"/>
+          <a:bodyPr spcFirstLastPara="1" wrap="square" lIns="96645" tIns="96645" rIns="96645" bIns="96645" anchor="t" anchorCtr="0"/>
           <a:lstStyle>
             <a:lvl1pPr lvl="0">
               <a:spcBef>
@@ -3237,17 +3148,17 @@
         </p:nvSpPr>
         <p:spPr>
           <a:xfrm>
-            <a:off x="311700" y="1152475"/>
-            <a:ext cx="3999900" cy="3416400"/>
+            <a:off x="327285" y="1639075"/>
+            <a:ext cx="4199895" cy="4858880"/>
           </a:xfrm>
           <a:prstGeom prst="rect">
             <a:avLst/>
           </a:prstGeom>
         </p:spPr>
         <p:txBody>
-          <a:bodyPr spcFirstLastPara="1" wrap="square" lIns="91425" tIns="91425" rIns="91425" bIns="91425" anchor="t" anchorCtr="0"/>
+          <a:bodyPr spcFirstLastPara="1" wrap="square" lIns="96645" tIns="96645" rIns="96645" bIns="96645" anchor="t" anchorCtr="0"/>
           <a:lstStyle>
-            <a:lvl1pPr marL="457200" lvl="0" indent="-317500">
+            <a:lvl1pPr marL="483306" lvl="0" indent="-335629">
               <a:spcBef>
                 <a:spcPts val="0"/>
               </a:spcBef>
@@ -3256,95 +3167,95 @@
               </a:spcAft>
               <a:buSzPts val="1400"/>
               <a:buChar char="●"/>
-              <a:defRPr sz="1400"/>
+              <a:defRPr sz="1500"/>
             </a:lvl1pPr>
-            <a:lvl2pPr marL="914400" lvl="1" indent="-304800">
-              <a:spcBef>
-                <a:spcPts val="1600"/>
+            <a:lvl2pPr marL="966612" lvl="1" indent="-322204">
+              <a:spcBef>
+                <a:spcPts val="1691"/>
               </a:spcBef>
               <a:spcAft>
                 <a:spcPts val="0"/>
               </a:spcAft>
               <a:buSzPts val="1200"/>
               <a:buChar char="○"/>
-              <a:defRPr sz="1200"/>
+              <a:defRPr sz="1300"/>
             </a:lvl2pPr>
-            <a:lvl3pPr marL="1371600" lvl="2" indent="-304800">
-              <a:spcBef>
-                <a:spcPts val="1600"/>
+            <a:lvl3pPr marL="1449918" lvl="2" indent="-322204">
+              <a:spcBef>
+                <a:spcPts val="1691"/>
               </a:spcBef>
               <a:spcAft>
                 <a:spcPts val="0"/>
               </a:spcAft>
               <a:buSzPts val="1200"/>
               <a:buChar char="■"/>
-              <a:defRPr sz="1200"/>
+              <a:defRPr sz="1300"/>
             </a:lvl3pPr>
-            <a:lvl4pPr marL="1828800" lvl="3" indent="-304800">
-              <a:spcBef>
-                <a:spcPts val="1600"/>
+            <a:lvl4pPr marL="1933224" lvl="3" indent="-322204">
+              <a:spcBef>
+                <a:spcPts val="1691"/>
               </a:spcBef>
               <a:spcAft>
                 <a:spcPts val="0"/>
               </a:spcAft>
               <a:buSzPts val="1200"/>
               <a:buChar char="●"/>
-              <a:defRPr sz="1200"/>
+              <a:defRPr sz="1300"/>
             </a:lvl4pPr>
-            <a:lvl5pPr marL="2286000" lvl="4" indent="-304800">
-              <a:spcBef>
-                <a:spcPts val="1600"/>
+            <a:lvl5pPr marL="2416531" lvl="4" indent="-322204">
+              <a:spcBef>
+                <a:spcPts val="1691"/>
               </a:spcBef>
               <a:spcAft>
                 <a:spcPts val="0"/>
               </a:spcAft>
               <a:buSzPts val="1200"/>
               <a:buChar char="○"/>
-              <a:defRPr sz="1200"/>
+              <a:defRPr sz="1300"/>
             </a:lvl5pPr>
-            <a:lvl6pPr marL="2743200" lvl="5" indent="-304800">
-              <a:spcBef>
-                <a:spcPts val="1600"/>
+            <a:lvl6pPr marL="2899837" lvl="5" indent="-322204">
+              <a:spcBef>
+                <a:spcPts val="1691"/>
               </a:spcBef>
               <a:spcAft>
                 <a:spcPts val="0"/>
               </a:spcAft>
               <a:buSzPts val="1200"/>
               <a:buChar char="■"/>
-              <a:defRPr sz="1200"/>
+              <a:defRPr sz="1300"/>
             </a:lvl6pPr>
-            <a:lvl7pPr marL="3200400" lvl="6" indent="-304800">
-              <a:spcBef>
-                <a:spcPts val="1600"/>
+            <a:lvl7pPr marL="3383143" lvl="6" indent="-322204">
+              <a:spcBef>
+                <a:spcPts val="1691"/>
               </a:spcBef>
               <a:spcAft>
                 <a:spcPts val="0"/>
               </a:spcAft>
               <a:buSzPts val="1200"/>
               <a:buChar char="●"/>
-              <a:defRPr sz="1200"/>
+              <a:defRPr sz="1300"/>
             </a:lvl7pPr>
-            <a:lvl8pPr marL="3657600" lvl="7" indent="-304800">
-              <a:spcBef>
-                <a:spcPts val="1600"/>
+            <a:lvl8pPr marL="3866449" lvl="7" indent="-322204">
+              <a:spcBef>
+                <a:spcPts val="1691"/>
               </a:spcBef>
               <a:spcAft>
                 <a:spcPts val="0"/>
               </a:spcAft>
               <a:buSzPts val="1200"/>
               <a:buChar char="○"/>
-              <a:defRPr sz="1200"/>
+              <a:defRPr sz="1300"/>
             </a:lvl8pPr>
-            <a:lvl9pPr marL="4114800" lvl="8" indent="-304800">
-              <a:spcBef>
-                <a:spcPts val="1600"/>
-              </a:spcBef>
-              <a:spcAft>
-                <a:spcPts val="1600"/>
+            <a:lvl9pPr marL="4349755" lvl="8" indent="-322204">
+              <a:spcBef>
+                <a:spcPts val="1691"/>
+              </a:spcBef>
+              <a:spcAft>
+                <a:spcPts val="1691"/>
               </a:spcAft>
               <a:buSzPts val="1200"/>
               <a:buChar char="■"/>
-              <a:defRPr sz="1200"/>
+              <a:defRPr sz="1300"/>
             </a:lvl9pPr>
           </a:lstStyle>
           <a:p>
@@ -3364,17 +3275,17 @@
         </p:nvSpPr>
         <p:spPr>
           <a:xfrm>
-            <a:off x="4832400" y="1152475"/>
-            <a:ext cx="3999900" cy="3416400"/>
+            <a:off x="5074020" y="1639075"/>
+            <a:ext cx="4199895" cy="4858880"/>
           </a:xfrm>
           <a:prstGeom prst="rect">
             <a:avLst/>
           </a:prstGeom>
         </p:spPr>
         <p:txBody>
-          <a:bodyPr spcFirstLastPara="1" wrap="square" lIns="91425" tIns="91425" rIns="91425" bIns="91425" anchor="t" anchorCtr="0"/>
+          <a:bodyPr spcFirstLastPara="1" wrap="square" lIns="96645" tIns="96645" rIns="96645" bIns="96645" anchor="t" anchorCtr="0"/>
           <a:lstStyle>
-            <a:lvl1pPr marL="457200" lvl="0" indent="-317500">
+            <a:lvl1pPr marL="483306" lvl="0" indent="-335629">
               <a:spcBef>
                 <a:spcPts val="0"/>
               </a:spcBef>
@@ -3383,95 +3294,95 @@
               </a:spcAft>
               <a:buSzPts val="1400"/>
               <a:buChar char="●"/>
-              <a:defRPr sz="1400"/>
+              <a:defRPr sz="1500"/>
             </a:lvl1pPr>
-            <a:lvl2pPr marL="914400" lvl="1" indent="-304800">
-              <a:spcBef>
-                <a:spcPts val="1600"/>
+            <a:lvl2pPr marL="966612" lvl="1" indent="-322204">
+              <a:spcBef>
+                <a:spcPts val="1691"/>
               </a:spcBef>
               <a:spcAft>
                 <a:spcPts val="0"/>
               </a:spcAft>
               <a:buSzPts val="1200"/>
               <a:buChar char="○"/>
-              <a:defRPr sz="1200"/>
+              <a:defRPr sz="1300"/>
             </a:lvl2pPr>
-            <a:lvl3pPr marL="1371600" lvl="2" indent="-304800">
-              <a:spcBef>
-                <a:spcPts val="1600"/>
+            <a:lvl3pPr marL="1449918" lvl="2" indent="-322204">
+              <a:spcBef>
+                <a:spcPts val="1691"/>
               </a:spcBef>
               <a:spcAft>
                 <a:spcPts val="0"/>
               </a:spcAft>
               <a:buSzPts val="1200"/>
               <a:buChar char="■"/>
-              <a:defRPr sz="1200"/>
+              <a:defRPr sz="1300"/>
             </a:lvl3pPr>
-            <a:lvl4pPr marL="1828800" lvl="3" indent="-304800">
-              <a:spcBef>
-                <a:spcPts val="1600"/>
+            <a:lvl4pPr marL="1933224" lvl="3" indent="-322204">
+              <a:spcBef>
+                <a:spcPts val="1691"/>
               </a:spcBef>
               <a:spcAft>
                 <a:spcPts val="0"/>
               </a:spcAft>
               <a:buSzPts val="1200"/>
               <a:buChar char="●"/>
-              <a:defRPr sz="1200"/>
+              <a:defRPr sz="1300"/>
             </a:lvl4pPr>
-            <a:lvl5pPr marL="2286000" lvl="4" indent="-304800">
-              <a:spcBef>
-                <a:spcPts val="1600"/>
+            <a:lvl5pPr marL="2416531" lvl="4" indent="-322204">
+              <a:spcBef>
+                <a:spcPts val="1691"/>
               </a:spcBef>
               <a:spcAft>
                 <a:spcPts val="0"/>
               </a:spcAft>
               <a:buSzPts val="1200"/>
               <a:buChar char="○"/>
-              <a:defRPr sz="1200"/>
+              <a:defRPr sz="1300"/>
             </a:lvl5pPr>
-            <a:lvl6pPr marL="2743200" lvl="5" indent="-304800">
-              <a:spcBef>
-                <a:spcPts val="1600"/>
+            <a:lvl6pPr marL="2899837" lvl="5" indent="-322204">
+              <a:spcBef>
+                <a:spcPts val="1691"/>
               </a:spcBef>
               <a:spcAft>
                 <a:spcPts val="0"/>
               </a:spcAft>
               <a:buSzPts val="1200"/>
               <a:buChar char="■"/>
-              <a:defRPr sz="1200"/>
+              <a:defRPr sz="1300"/>
             </a:lvl6pPr>
-            <a:lvl7pPr marL="3200400" lvl="6" indent="-304800">
-              <a:spcBef>
-                <a:spcPts val="1600"/>
+            <a:lvl7pPr marL="3383143" lvl="6" indent="-322204">
+              <a:spcBef>
+                <a:spcPts val="1691"/>
               </a:spcBef>
               <a:spcAft>
                 <a:spcPts val="0"/>
               </a:spcAft>
               <a:buSzPts val="1200"/>
               <a:buChar char="●"/>
-              <a:defRPr sz="1200"/>
+              <a:defRPr sz="1300"/>
             </a:lvl7pPr>
-            <a:lvl8pPr marL="3657600" lvl="7" indent="-304800">
-              <a:spcBef>
-                <a:spcPts val="1600"/>
+            <a:lvl8pPr marL="3866449" lvl="7" indent="-322204">
+              <a:spcBef>
+                <a:spcPts val="1691"/>
               </a:spcBef>
               <a:spcAft>
                 <a:spcPts val="0"/>
               </a:spcAft>
               <a:buSzPts val="1200"/>
               <a:buChar char="○"/>
-              <a:defRPr sz="1200"/>
+              <a:defRPr sz="1300"/>
             </a:lvl8pPr>
-            <a:lvl9pPr marL="4114800" lvl="8" indent="-304800">
-              <a:spcBef>
-                <a:spcPts val="1600"/>
-              </a:spcBef>
-              <a:spcAft>
-                <a:spcPts val="1600"/>
+            <a:lvl9pPr marL="4349755" lvl="8" indent="-322204">
+              <a:spcBef>
+                <a:spcPts val="1691"/>
+              </a:spcBef>
+              <a:spcAft>
+                <a:spcPts val="1691"/>
               </a:spcAft>
               <a:buSzPts val="1200"/>
               <a:buChar char="■"/>
-              <a:defRPr sz="1200"/>
+              <a:defRPr sz="1300"/>
             </a:lvl9pPr>
           </a:lstStyle>
           <a:p>
@@ -3491,15 +3402,15 @@
         </p:nvSpPr>
         <p:spPr>
           <a:xfrm>
-            <a:off x="8472458" y="4663217"/>
-            <a:ext cx="548700" cy="393600"/>
+            <a:off x="8896081" y="6632131"/>
+            <a:ext cx="576135" cy="559787"/>
           </a:xfrm>
           <a:prstGeom prst="rect">
             <a:avLst/>
           </a:prstGeom>
         </p:spPr>
         <p:txBody>
-          <a:bodyPr spcFirstLastPara="1" wrap="square" lIns="91425" tIns="91425" rIns="91425" bIns="91425" anchor="ctr" anchorCtr="0">
+          <a:bodyPr spcFirstLastPara="1" wrap="square" lIns="96645" tIns="96645" rIns="96645" bIns="96645" anchor="ctr" anchorCtr="0">
             <a:noAutofit/>
           </a:bodyPr>
           <a:lstStyle>
@@ -3541,20 +3452,12 @@
             </a:lvl9pPr>
           </a:lstStyle>
           <a:p>
-            <a:pPr marL="0" lvl="0" indent="0">
-              <a:spcBef>
-                <a:spcPts val="0"/>
-              </a:spcBef>
-              <a:spcAft>
-                <a:spcPts val="0"/>
-              </a:spcAft>
-              <a:buNone/>
-            </a:pPr>
             <a:fld id="{00000000-1234-1234-1234-123412341234}" type="slidenum">
-              <a:rPr lang="en"/>
+              <a:rPr lang="en" smtClean="0"/>
+              <a:pPr/>
               <a:t>‹#›</a:t>
             </a:fld>
-            <a:endParaRPr/>
+            <a:endParaRPr lang="en"/>
           </a:p>
         </p:txBody>
       </p:sp>
@@ -3595,15 +3498,15 @@
         </p:nvSpPr>
         <p:spPr>
           <a:xfrm>
-            <a:off x="311700" y="445025"/>
-            <a:ext cx="8520600" cy="572700"/>
+            <a:off x="327285" y="632925"/>
+            <a:ext cx="8946630" cy="814507"/>
           </a:xfrm>
           <a:prstGeom prst="rect">
             <a:avLst/>
           </a:prstGeom>
         </p:spPr>
         <p:txBody>
-          <a:bodyPr spcFirstLastPara="1" wrap="square" lIns="91425" tIns="91425" rIns="91425" bIns="91425" anchor="t" anchorCtr="0"/>
+          <a:bodyPr spcFirstLastPara="1" wrap="square" lIns="96645" tIns="96645" rIns="96645" bIns="96645" anchor="t" anchorCtr="0"/>
           <a:lstStyle>
             <a:lvl1pPr lvl="0">
               <a:spcBef>
@@ -3722,15 +3625,15 @@
         </p:nvSpPr>
         <p:spPr>
           <a:xfrm>
-            <a:off x="8472458" y="4663217"/>
-            <a:ext cx="548700" cy="393600"/>
+            <a:off x="8896081" y="6632131"/>
+            <a:ext cx="576135" cy="559787"/>
           </a:xfrm>
           <a:prstGeom prst="rect">
             <a:avLst/>
           </a:prstGeom>
         </p:spPr>
         <p:txBody>
-          <a:bodyPr spcFirstLastPara="1" wrap="square" lIns="91425" tIns="91425" rIns="91425" bIns="91425" anchor="ctr" anchorCtr="0">
+          <a:bodyPr spcFirstLastPara="1" wrap="square" lIns="96645" tIns="96645" rIns="96645" bIns="96645" anchor="ctr" anchorCtr="0">
             <a:noAutofit/>
           </a:bodyPr>
           <a:lstStyle>
@@ -3772,20 +3675,12 @@
             </a:lvl9pPr>
           </a:lstStyle>
           <a:p>
-            <a:pPr marL="0" lvl="0" indent="0">
-              <a:spcBef>
-                <a:spcPts val="0"/>
-              </a:spcBef>
-              <a:spcAft>
-                <a:spcPts val="0"/>
-              </a:spcAft>
-              <a:buNone/>
-            </a:pPr>
             <a:fld id="{00000000-1234-1234-1234-123412341234}" type="slidenum">
-              <a:rPr lang="en"/>
+              <a:rPr lang="en" smtClean="0"/>
+              <a:pPr/>
               <a:t>‹#›</a:t>
             </a:fld>
-            <a:endParaRPr/>
+            <a:endParaRPr lang="en"/>
           </a:p>
         </p:txBody>
       </p:sp>
@@ -3826,15 +3721,15 @@
         </p:nvSpPr>
         <p:spPr>
           <a:xfrm>
-            <a:off x="311700" y="555600"/>
-            <a:ext cx="2808000" cy="755700"/>
+            <a:off x="327285" y="790187"/>
+            <a:ext cx="2948400" cy="1074773"/>
           </a:xfrm>
           <a:prstGeom prst="rect">
             <a:avLst/>
           </a:prstGeom>
         </p:spPr>
         <p:txBody>
-          <a:bodyPr spcFirstLastPara="1" wrap="square" lIns="91425" tIns="91425" rIns="91425" bIns="91425" anchor="b" anchorCtr="0"/>
+          <a:bodyPr spcFirstLastPara="1" wrap="square" lIns="96645" tIns="96645" rIns="96645" bIns="96645" anchor="b" anchorCtr="0"/>
           <a:lstStyle>
             <a:lvl1pPr lvl="0">
               <a:spcBef>
@@ -3845,7 +3740,7 @@
               </a:spcAft>
               <a:buSzPts val="2400"/>
               <a:buNone/>
-              <a:defRPr sz="2400"/>
+              <a:defRPr sz="2500"/>
             </a:lvl1pPr>
             <a:lvl2pPr lvl="1">
               <a:spcBef>
@@ -3856,7 +3751,7 @@
               </a:spcAft>
               <a:buSzPts val="2400"/>
               <a:buNone/>
-              <a:defRPr sz="2400"/>
+              <a:defRPr sz="2500"/>
             </a:lvl2pPr>
             <a:lvl3pPr lvl="2">
               <a:spcBef>
@@ -3867,7 +3762,7 @@
               </a:spcAft>
               <a:buSzPts val="2400"/>
               <a:buNone/>
-              <a:defRPr sz="2400"/>
+              <a:defRPr sz="2500"/>
             </a:lvl3pPr>
             <a:lvl4pPr lvl="3">
               <a:spcBef>
@@ -3878,7 +3773,7 @@
               </a:spcAft>
               <a:buSzPts val="2400"/>
               <a:buNone/>
-              <a:defRPr sz="2400"/>
+              <a:defRPr sz="2500"/>
             </a:lvl4pPr>
             <a:lvl5pPr lvl="4">
               <a:spcBef>
@@ -3889,7 +3784,7 @@
               </a:spcAft>
               <a:buSzPts val="2400"/>
               <a:buNone/>
-              <a:defRPr sz="2400"/>
+              <a:defRPr sz="2500"/>
             </a:lvl5pPr>
             <a:lvl6pPr lvl="5">
               <a:spcBef>
@@ -3900,7 +3795,7 @@
               </a:spcAft>
               <a:buSzPts val="2400"/>
               <a:buNone/>
-              <a:defRPr sz="2400"/>
+              <a:defRPr sz="2500"/>
             </a:lvl6pPr>
             <a:lvl7pPr lvl="6">
               <a:spcBef>
@@ -3911,7 +3806,7 @@
               </a:spcAft>
               <a:buSzPts val="2400"/>
               <a:buNone/>
-              <a:defRPr sz="2400"/>
+              <a:defRPr sz="2500"/>
             </a:lvl7pPr>
             <a:lvl8pPr lvl="7">
               <a:spcBef>
@@ -3922,7 +3817,7 @@
               </a:spcAft>
               <a:buSzPts val="2400"/>
               <a:buNone/>
-              <a:defRPr sz="2400"/>
+              <a:defRPr sz="2500"/>
             </a:lvl8pPr>
             <a:lvl9pPr lvl="8">
               <a:spcBef>
@@ -3933,7 +3828,7 @@
               </a:spcAft>
               <a:buSzPts val="2400"/>
               <a:buNone/>
-              <a:defRPr sz="2400"/>
+              <a:defRPr sz="2500"/>
             </a:lvl9pPr>
           </a:lstStyle>
           <a:p>
@@ -3953,17 +3848,17 @@
         </p:nvSpPr>
         <p:spPr>
           <a:xfrm>
-            <a:off x="311700" y="1389600"/>
-            <a:ext cx="2808000" cy="3179400"/>
+            <a:off x="327285" y="1976320"/>
+            <a:ext cx="2948400" cy="4521813"/>
           </a:xfrm>
           <a:prstGeom prst="rect">
             <a:avLst/>
           </a:prstGeom>
         </p:spPr>
         <p:txBody>
-          <a:bodyPr spcFirstLastPara="1" wrap="square" lIns="91425" tIns="91425" rIns="91425" bIns="91425" anchor="t" anchorCtr="0"/>
+          <a:bodyPr spcFirstLastPara="1" wrap="square" lIns="96645" tIns="96645" rIns="96645" bIns="96645" anchor="t" anchorCtr="0"/>
           <a:lstStyle>
-            <a:lvl1pPr marL="457200" lvl="0" indent="-304800">
+            <a:lvl1pPr marL="483306" lvl="0" indent="-322204">
               <a:spcBef>
                 <a:spcPts val="0"/>
               </a:spcBef>
@@ -3972,95 +3867,95 @@
               </a:spcAft>
               <a:buSzPts val="1200"/>
               <a:buChar char="●"/>
-              <a:defRPr sz="1200"/>
+              <a:defRPr sz="1300"/>
             </a:lvl1pPr>
-            <a:lvl2pPr marL="914400" lvl="1" indent="-304800">
-              <a:spcBef>
-                <a:spcPts val="1600"/>
+            <a:lvl2pPr marL="966612" lvl="1" indent="-322204">
+              <a:spcBef>
+                <a:spcPts val="1691"/>
               </a:spcBef>
               <a:spcAft>
                 <a:spcPts val="0"/>
               </a:spcAft>
               <a:buSzPts val="1200"/>
               <a:buChar char="○"/>
-              <a:defRPr sz="1200"/>
+              <a:defRPr sz="1300"/>
             </a:lvl2pPr>
-            <a:lvl3pPr marL="1371600" lvl="2" indent="-304800">
-              <a:spcBef>
-                <a:spcPts val="1600"/>
+            <a:lvl3pPr marL="1449918" lvl="2" indent="-322204">
+              <a:spcBef>
+                <a:spcPts val="1691"/>
               </a:spcBef>
               <a:spcAft>
                 <a:spcPts val="0"/>
               </a:spcAft>
               <a:buSzPts val="1200"/>
               <a:buChar char="■"/>
-              <a:defRPr sz="1200"/>
+              <a:defRPr sz="1300"/>
             </a:lvl3pPr>
-            <a:lvl4pPr marL="1828800" lvl="3" indent="-304800">
-              <a:spcBef>
-                <a:spcPts val="1600"/>
+            <a:lvl4pPr marL="1933224" lvl="3" indent="-322204">
+              <a:spcBef>
+                <a:spcPts val="1691"/>
               </a:spcBef>
               <a:spcAft>
                 <a:spcPts val="0"/>
               </a:spcAft>
               <a:buSzPts val="1200"/>
               <a:buChar char="●"/>
-              <a:defRPr sz="1200"/>
+              <a:defRPr sz="1300"/>
             </a:lvl4pPr>
-            <a:lvl5pPr marL="2286000" lvl="4" indent="-304800">
-              <a:spcBef>
-                <a:spcPts val="1600"/>
+            <a:lvl5pPr marL="2416531" lvl="4" indent="-322204">
+              <a:spcBef>
+                <a:spcPts val="1691"/>
               </a:spcBef>
               <a:spcAft>
                 <a:spcPts val="0"/>
               </a:spcAft>
               <a:buSzPts val="1200"/>
               <a:buChar char="○"/>
-              <a:defRPr sz="1200"/>
+              <a:defRPr sz="1300"/>
             </a:lvl5pPr>
-            <a:lvl6pPr marL="2743200" lvl="5" indent="-304800">
-              <a:spcBef>
-                <a:spcPts val="1600"/>
+            <a:lvl6pPr marL="2899837" lvl="5" indent="-322204">
+              <a:spcBef>
+                <a:spcPts val="1691"/>
               </a:spcBef>
               <a:spcAft>
                 <a:spcPts val="0"/>
               </a:spcAft>
               <a:buSzPts val="1200"/>
               <a:buChar char="■"/>
-              <a:defRPr sz="1200"/>
+              <a:defRPr sz="1300"/>
             </a:lvl6pPr>
-            <a:lvl7pPr marL="3200400" lvl="6" indent="-304800">
-              <a:spcBef>
-                <a:spcPts val="1600"/>
+            <a:lvl7pPr marL="3383143" lvl="6" indent="-322204">
+              <a:spcBef>
+                <a:spcPts val="1691"/>
               </a:spcBef>
               <a:spcAft>
                 <a:spcPts val="0"/>
               </a:spcAft>
               <a:buSzPts val="1200"/>
               <a:buChar char="●"/>
-              <a:defRPr sz="1200"/>
+              <a:defRPr sz="1300"/>
             </a:lvl7pPr>
-            <a:lvl8pPr marL="3657600" lvl="7" indent="-304800">
-              <a:spcBef>
-                <a:spcPts val="1600"/>
+            <a:lvl8pPr marL="3866449" lvl="7" indent="-322204">
+              <a:spcBef>
+                <a:spcPts val="1691"/>
               </a:spcBef>
               <a:spcAft>
                 <a:spcPts val="0"/>
               </a:spcAft>
               <a:buSzPts val="1200"/>
               <a:buChar char="○"/>
-              <a:defRPr sz="1200"/>
+              <a:defRPr sz="1300"/>
             </a:lvl8pPr>
-            <a:lvl9pPr marL="4114800" lvl="8" indent="-304800">
-              <a:spcBef>
-                <a:spcPts val="1600"/>
-              </a:spcBef>
-              <a:spcAft>
-                <a:spcPts val="1600"/>
+            <a:lvl9pPr marL="4349755" lvl="8" indent="-322204">
+              <a:spcBef>
+                <a:spcPts val="1691"/>
+              </a:spcBef>
+              <a:spcAft>
+                <a:spcPts val="1691"/>
               </a:spcAft>
               <a:buSzPts val="1200"/>
               <a:buChar char="■"/>
-              <a:defRPr sz="1200"/>
+              <a:defRPr sz="1300"/>
             </a:lvl9pPr>
           </a:lstStyle>
           <a:p>
@@ -4080,15 +3975,15 @@
         </p:nvSpPr>
         <p:spPr>
           <a:xfrm>
-            <a:off x="8472458" y="4663217"/>
-            <a:ext cx="548700" cy="393600"/>
+            <a:off x="8896081" y="6632131"/>
+            <a:ext cx="576135" cy="559787"/>
           </a:xfrm>
           <a:prstGeom prst="rect">
             <a:avLst/>
           </a:prstGeom>
         </p:spPr>
         <p:txBody>
-          <a:bodyPr spcFirstLastPara="1" wrap="square" lIns="91425" tIns="91425" rIns="91425" bIns="91425" anchor="ctr" anchorCtr="0">
+          <a:bodyPr spcFirstLastPara="1" wrap="square" lIns="96645" tIns="96645" rIns="96645" bIns="96645" anchor="ctr" anchorCtr="0">
             <a:noAutofit/>
           </a:bodyPr>
           <a:lstStyle>
@@ -4130,20 +4025,12 @@
             </a:lvl9pPr>
           </a:lstStyle>
           <a:p>
-            <a:pPr marL="0" lvl="0" indent="0">
-              <a:spcBef>
-                <a:spcPts val="0"/>
-              </a:spcBef>
-              <a:spcAft>
-                <a:spcPts val="0"/>
-              </a:spcAft>
-              <a:buNone/>
-            </a:pPr>
             <a:fld id="{00000000-1234-1234-1234-123412341234}" type="slidenum">
-              <a:rPr lang="en"/>
+              <a:rPr lang="en" smtClean="0"/>
+              <a:pPr/>
               <a:t>‹#›</a:t>
             </a:fld>
-            <a:endParaRPr/>
+            <a:endParaRPr lang="en"/>
           </a:p>
         </p:txBody>
       </p:sp>
@@ -4184,15 +4071,15 @@
         </p:nvSpPr>
         <p:spPr>
           <a:xfrm>
-            <a:off x="490250" y="450150"/>
-            <a:ext cx="6367800" cy="4090800"/>
+            <a:off x="514763" y="640213"/>
+            <a:ext cx="6686190" cy="5818027"/>
           </a:xfrm>
           <a:prstGeom prst="rect">
             <a:avLst/>
           </a:prstGeom>
         </p:spPr>
         <p:txBody>
-          <a:bodyPr spcFirstLastPara="1" wrap="square" lIns="91425" tIns="91425" rIns="91425" bIns="91425" anchor="ctr" anchorCtr="0"/>
+          <a:bodyPr spcFirstLastPara="1" wrap="square" lIns="96645" tIns="96645" rIns="96645" bIns="96645" anchor="ctr" anchorCtr="0"/>
           <a:lstStyle>
             <a:lvl1pPr lvl="0">
               <a:spcBef>
@@ -4203,7 +4090,7 @@
               </a:spcAft>
               <a:buSzPts val="4800"/>
               <a:buNone/>
-              <a:defRPr sz="4800"/>
+              <a:defRPr sz="5100"/>
             </a:lvl1pPr>
             <a:lvl2pPr lvl="1">
               <a:spcBef>
@@ -4214,7 +4101,7 @@
               </a:spcAft>
               <a:buSzPts val="4800"/>
               <a:buNone/>
-              <a:defRPr sz="4800"/>
+              <a:defRPr sz="5100"/>
             </a:lvl2pPr>
             <a:lvl3pPr lvl="2">
               <a:spcBef>
@@ -4225,7 +4112,7 @@
               </a:spcAft>
               <a:buSzPts val="4800"/>
               <a:buNone/>
-              <a:defRPr sz="4800"/>
+              <a:defRPr sz="5100"/>
             </a:lvl3pPr>
             <a:lvl4pPr lvl="3">
               <a:spcBef>
@@ -4236,7 +4123,7 @@
               </a:spcAft>
               <a:buSzPts val="4800"/>
               <a:buNone/>
-              <a:defRPr sz="4800"/>
+              <a:defRPr sz="5100"/>
             </a:lvl4pPr>
             <a:lvl5pPr lvl="4">
               <a:spcBef>
@@ -4247,7 +4134,7 @@
               </a:spcAft>
               <a:buSzPts val="4800"/>
               <a:buNone/>
-              <a:defRPr sz="4800"/>
+              <a:defRPr sz="5100"/>
             </a:lvl5pPr>
             <a:lvl6pPr lvl="5">
               <a:spcBef>
@@ -4258,7 +4145,7 @@
               </a:spcAft>
               <a:buSzPts val="4800"/>
               <a:buNone/>
-              <a:defRPr sz="4800"/>
+              <a:defRPr sz="5100"/>
             </a:lvl6pPr>
             <a:lvl7pPr lvl="6">
               <a:spcBef>
@@ -4269,7 +4156,7 @@
               </a:spcAft>
               <a:buSzPts val="4800"/>
               <a:buNone/>
-              <a:defRPr sz="4800"/>
+              <a:defRPr sz="5100"/>
             </a:lvl7pPr>
             <a:lvl8pPr lvl="7">
               <a:spcBef>
@@ -4280,7 +4167,7 @@
               </a:spcAft>
               <a:buSzPts val="4800"/>
               <a:buNone/>
-              <a:defRPr sz="4800"/>
+              <a:defRPr sz="5100"/>
             </a:lvl8pPr>
             <a:lvl9pPr lvl="8">
               <a:spcBef>
@@ -4291,7 +4178,7 @@
               </a:spcAft>
               <a:buSzPts val="4800"/>
               <a:buNone/>
-              <a:defRPr sz="4800"/>
+              <a:defRPr sz="5100"/>
             </a:lvl9pPr>
           </a:lstStyle>
           <a:p>
@@ -4311,15 +4198,15 @@
         </p:nvSpPr>
         <p:spPr>
           <a:xfrm>
-            <a:off x="8472458" y="4663217"/>
-            <a:ext cx="548700" cy="393600"/>
+            <a:off x="8896081" y="6632131"/>
+            <a:ext cx="576135" cy="559787"/>
           </a:xfrm>
           <a:prstGeom prst="rect">
             <a:avLst/>
           </a:prstGeom>
         </p:spPr>
         <p:txBody>
-          <a:bodyPr spcFirstLastPara="1" wrap="square" lIns="91425" tIns="91425" rIns="91425" bIns="91425" anchor="ctr" anchorCtr="0">
+          <a:bodyPr spcFirstLastPara="1" wrap="square" lIns="96645" tIns="96645" rIns="96645" bIns="96645" anchor="ctr" anchorCtr="0">
             <a:noAutofit/>
           </a:bodyPr>
           <a:lstStyle>
@@ -4361,20 +4248,12 @@
             </a:lvl9pPr>
           </a:lstStyle>
           <a:p>
-            <a:pPr marL="0" lvl="0" indent="0">
-              <a:spcBef>
-                <a:spcPts val="0"/>
-              </a:spcBef>
-              <a:spcAft>
-                <a:spcPts val="0"/>
-              </a:spcAft>
-              <a:buNone/>
-            </a:pPr>
             <a:fld id="{00000000-1234-1234-1234-123412341234}" type="slidenum">
-              <a:rPr lang="en"/>
+              <a:rPr lang="en" smtClean="0"/>
+              <a:pPr/>
               <a:t>‹#›</a:t>
             </a:fld>
-            <a:endParaRPr/>
+            <a:endParaRPr lang="en"/>
           </a:p>
         </p:txBody>
       </p:sp>
@@ -4411,8 +4290,8 @@
         </p:nvSpPr>
         <p:spPr>
           <a:xfrm>
-            <a:off x="4572000" y="-125"/>
-            <a:ext cx="4572000" cy="5143500"/>
+            <a:off x="4800600" y="-178"/>
+            <a:ext cx="4800600" cy="7315200"/>
           </a:xfrm>
           <a:prstGeom prst="rect">
             <a:avLst/>
@@ -4425,7 +4304,7 @@
           </a:ln>
         </p:spPr>
         <p:txBody>
-          <a:bodyPr spcFirstLastPara="1" wrap="square" lIns="91425" tIns="91425" rIns="91425" bIns="91425" anchor="ctr" anchorCtr="0">
+          <a:bodyPr spcFirstLastPara="1" wrap="square" lIns="96645" tIns="96645" rIns="96645" bIns="96645" anchor="ctr" anchorCtr="0">
             <a:noAutofit/>
           </a:bodyPr>
           <a:lstStyle/>
@@ -4455,15 +4334,15 @@
         </p:nvSpPr>
         <p:spPr>
           <a:xfrm>
-            <a:off x="265500" y="1233175"/>
-            <a:ext cx="4045200" cy="1482300"/>
+            <a:off x="278775" y="1753849"/>
+            <a:ext cx="4247460" cy="2108160"/>
           </a:xfrm>
           <a:prstGeom prst="rect">
             <a:avLst/>
           </a:prstGeom>
         </p:spPr>
         <p:txBody>
-          <a:bodyPr spcFirstLastPara="1" wrap="square" lIns="91425" tIns="91425" rIns="91425" bIns="91425" anchor="b" anchorCtr="0"/>
+          <a:bodyPr spcFirstLastPara="1" wrap="square" lIns="96645" tIns="96645" rIns="96645" bIns="96645" anchor="b" anchorCtr="0"/>
           <a:lstStyle>
             <a:lvl1pPr lvl="0" algn="ctr">
               <a:spcBef>
@@ -4474,7 +4353,7 @@
               </a:spcAft>
               <a:buSzPts val="4200"/>
               <a:buNone/>
-              <a:defRPr sz="4200"/>
+              <a:defRPr sz="4400"/>
             </a:lvl1pPr>
             <a:lvl2pPr lvl="1" algn="ctr">
               <a:spcBef>
@@ -4485,7 +4364,7 @@
               </a:spcAft>
               <a:buSzPts val="4200"/>
               <a:buNone/>
-              <a:defRPr sz="4200"/>
+              <a:defRPr sz="4400"/>
             </a:lvl2pPr>
             <a:lvl3pPr lvl="2" algn="ctr">
               <a:spcBef>
@@ -4496,7 +4375,7 @@
               </a:spcAft>
               <a:buSzPts val="4200"/>
               <a:buNone/>
-              <a:defRPr sz="4200"/>
+              <a:defRPr sz="4400"/>
             </a:lvl3pPr>
             <a:lvl4pPr lvl="3" algn="ctr">
               <a:spcBef>
@@ -4507,7 +4386,7 @@
               </a:spcAft>
               <a:buSzPts val="4200"/>
               <a:buNone/>
-              <a:defRPr sz="4200"/>
+              <a:defRPr sz="4400"/>
             </a:lvl4pPr>
             <a:lvl5pPr lvl="4" algn="ctr">
               <a:spcBef>
@@ -4518,7 +4397,7 @@
               </a:spcAft>
               <a:buSzPts val="4200"/>
               <a:buNone/>
-              <a:defRPr sz="4200"/>
+              <a:defRPr sz="4400"/>
             </a:lvl5pPr>
             <a:lvl6pPr lvl="5" algn="ctr">
               <a:spcBef>
@@ -4529,7 +4408,7 @@
               </a:spcAft>
               <a:buSzPts val="4200"/>
               <a:buNone/>
-              <a:defRPr sz="4200"/>
+              <a:defRPr sz="4400"/>
             </a:lvl6pPr>
             <a:lvl7pPr lvl="6" algn="ctr">
               <a:spcBef>
@@ -4540,7 +4419,7 @@
               </a:spcAft>
               <a:buSzPts val="4200"/>
               <a:buNone/>
-              <a:defRPr sz="4200"/>
+              <a:defRPr sz="4400"/>
             </a:lvl7pPr>
             <a:lvl8pPr lvl="7" algn="ctr">
               <a:spcBef>
@@ -4551,7 +4430,7 @@
               </a:spcAft>
               <a:buSzPts val="4200"/>
               <a:buNone/>
-              <a:defRPr sz="4200"/>
+              <a:defRPr sz="4400"/>
             </a:lvl8pPr>
             <a:lvl9pPr lvl="8" algn="ctr">
               <a:spcBef>
@@ -4562,7 +4441,7 @@
               </a:spcAft>
               <a:buSzPts val="4200"/>
               <a:buNone/>
-              <a:defRPr sz="4200"/>
+              <a:defRPr sz="4400"/>
             </a:lvl9pPr>
           </a:lstStyle>
           <a:p>
@@ -4582,15 +4461,15 @@
         </p:nvSpPr>
         <p:spPr>
           <a:xfrm>
-            <a:off x="265500" y="2803075"/>
-            <a:ext cx="4045200" cy="1235100"/>
+            <a:off x="278775" y="3986595"/>
+            <a:ext cx="4247460" cy="1756587"/>
           </a:xfrm>
           <a:prstGeom prst="rect">
             <a:avLst/>
           </a:prstGeom>
         </p:spPr>
         <p:txBody>
-          <a:bodyPr spcFirstLastPara="1" wrap="square" lIns="91425" tIns="91425" rIns="91425" bIns="91425" anchor="t" anchorCtr="0"/>
+          <a:bodyPr spcFirstLastPara="1" wrap="square" lIns="96645" tIns="96645" rIns="96645" bIns="96645" anchor="t" anchorCtr="0"/>
           <a:lstStyle>
             <a:lvl1pPr lvl="0" algn="ctr">
               <a:lnSpc>
@@ -4604,7 +4483,7 @@
               </a:spcAft>
               <a:buSzPts val="2100"/>
               <a:buNone/>
-              <a:defRPr sz="2100"/>
+              <a:defRPr sz="2200"/>
             </a:lvl1pPr>
             <a:lvl2pPr lvl="1" algn="ctr">
               <a:lnSpc>
@@ -4618,7 +4497,7 @@
               </a:spcAft>
               <a:buSzPts val="2100"/>
               <a:buNone/>
-              <a:defRPr sz="2100"/>
+              <a:defRPr sz="2200"/>
             </a:lvl2pPr>
             <a:lvl3pPr lvl="2" algn="ctr">
               <a:lnSpc>
@@ -4632,7 +4511,7 @@
               </a:spcAft>
               <a:buSzPts val="2100"/>
               <a:buNone/>
-              <a:defRPr sz="2100"/>
+              <a:defRPr sz="2200"/>
             </a:lvl3pPr>
             <a:lvl4pPr lvl="3" algn="ctr">
               <a:lnSpc>
@@ -4646,7 +4525,7 @@
               </a:spcAft>
               <a:buSzPts val="2100"/>
               <a:buNone/>
-              <a:defRPr sz="2100"/>
+              <a:defRPr sz="2200"/>
             </a:lvl4pPr>
             <a:lvl5pPr lvl="4" algn="ctr">
               <a:lnSpc>
@@ -4660,7 +4539,7 @@
               </a:spcAft>
               <a:buSzPts val="2100"/>
               <a:buNone/>
-              <a:defRPr sz="2100"/>
+              <a:defRPr sz="2200"/>
             </a:lvl5pPr>
             <a:lvl6pPr lvl="5" algn="ctr">
               <a:lnSpc>
@@ -4674,7 +4553,7 @@
               </a:spcAft>
               <a:buSzPts val="2100"/>
               <a:buNone/>
-              <a:defRPr sz="2100"/>
+              <a:defRPr sz="2200"/>
             </a:lvl6pPr>
             <a:lvl7pPr lvl="6" algn="ctr">
               <a:lnSpc>
@@ -4688,7 +4567,7 @@
               </a:spcAft>
               <a:buSzPts val="2100"/>
               <a:buNone/>
-              <a:defRPr sz="2100"/>
+              <a:defRPr sz="2200"/>
             </a:lvl7pPr>
             <a:lvl8pPr lvl="7" algn="ctr">
               <a:lnSpc>
@@ -4702,7 +4581,7 @@
               </a:spcAft>
               <a:buSzPts val="2100"/>
               <a:buNone/>
-              <a:defRPr sz="2100"/>
+              <a:defRPr sz="2200"/>
             </a:lvl8pPr>
             <a:lvl9pPr lvl="8" algn="ctr">
               <a:lnSpc>
@@ -4716,7 +4595,7 @@
               </a:spcAft>
               <a:buSzPts val="2100"/>
               <a:buNone/>
-              <a:defRPr sz="2100"/>
+              <a:defRPr sz="2200"/>
             </a:lvl9pPr>
           </a:lstStyle>
           <a:p>
@@ -4736,17 +4615,17 @@
         </p:nvSpPr>
         <p:spPr>
           <a:xfrm>
-            <a:off x="4939500" y="724075"/>
-            <a:ext cx="3837000" cy="3695100"/>
+            <a:off x="5186475" y="1029795"/>
+            <a:ext cx="4028850" cy="5255253"/>
           </a:xfrm>
           <a:prstGeom prst="rect">
             <a:avLst/>
           </a:prstGeom>
         </p:spPr>
         <p:txBody>
-          <a:bodyPr spcFirstLastPara="1" wrap="square" lIns="91425" tIns="91425" rIns="91425" bIns="91425" anchor="ctr" anchorCtr="0"/>
+          <a:bodyPr spcFirstLastPara="1" wrap="square" lIns="96645" tIns="96645" rIns="96645" bIns="96645" anchor="ctr" anchorCtr="0"/>
           <a:lstStyle>
-            <a:lvl1pPr marL="457200" lvl="0" indent="-342900">
+            <a:lvl1pPr marL="483306" lvl="0" indent="-362480">
               <a:spcBef>
                 <a:spcPts val="0"/>
               </a:spcBef>
@@ -4757,9 +4636,9 @@
               <a:buChar char="●"/>
               <a:defRPr/>
             </a:lvl1pPr>
-            <a:lvl2pPr marL="914400" lvl="1" indent="-317500">
-              <a:spcBef>
-                <a:spcPts val="1600"/>
+            <a:lvl2pPr marL="966612" lvl="1" indent="-335629">
+              <a:spcBef>
+                <a:spcPts val="1691"/>
               </a:spcBef>
               <a:spcAft>
                 <a:spcPts val="0"/>
@@ -4768,9 +4647,9 @@
               <a:buChar char="○"/>
               <a:defRPr/>
             </a:lvl2pPr>
-            <a:lvl3pPr marL="1371600" lvl="2" indent="-317500">
-              <a:spcBef>
-                <a:spcPts val="1600"/>
+            <a:lvl3pPr marL="1449918" lvl="2" indent="-335629">
+              <a:spcBef>
+                <a:spcPts val="1691"/>
               </a:spcBef>
               <a:spcAft>
                 <a:spcPts val="0"/>
@@ -4779,9 +4658,9 @@
               <a:buChar char="■"/>
               <a:defRPr/>
             </a:lvl3pPr>
-            <a:lvl4pPr marL="1828800" lvl="3" indent="-317500">
-              <a:spcBef>
-                <a:spcPts val="1600"/>
+            <a:lvl4pPr marL="1933224" lvl="3" indent="-335629">
+              <a:spcBef>
+                <a:spcPts val="1691"/>
               </a:spcBef>
               <a:spcAft>
                 <a:spcPts val="0"/>
@@ -4790,9 +4669,9 @@
               <a:buChar char="●"/>
               <a:defRPr/>
             </a:lvl4pPr>
-            <a:lvl5pPr marL="2286000" lvl="4" indent="-317500">
-              <a:spcBef>
-                <a:spcPts val="1600"/>
+            <a:lvl5pPr marL="2416531" lvl="4" indent="-335629">
+              <a:spcBef>
+                <a:spcPts val="1691"/>
               </a:spcBef>
               <a:spcAft>
                 <a:spcPts val="0"/>
@@ -4801,9 +4680,9 @@
               <a:buChar char="○"/>
               <a:defRPr/>
             </a:lvl5pPr>
-            <a:lvl6pPr marL="2743200" lvl="5" indent="-317500">
-              <a:spcBef>
-                <a:spcPts val="1600"/>
+            <a:lvl6pPr marL="2899837" lvl="5" indent="-335629">
+              <a:spcBef>
+                <a:spcPts val="1691"/>
               </a:spcBef>
               <a:spcAft>
                 <a:spcPts val="0"/>
@@ -4812,9 +4691,9 @@
               <a:buChar char="■"/>
               <a:defRPr/>
             </a:lvl6pPr>
-            <a:lvl7pPr marL="3200400" lvl="6" indent="-317500">
-              <a:spcBef>
-                <a:spcPts val="1600"/>
+            <a:lvl7pPr marL="3383143" lvl="6" indent="-335629">
+              <a:spcBef>
+                <a:spcPts val="1691"/>
               </a:spcBef>
               <a:spcAft>
                 <a:spcPts val="0"/>
@@ -4823,9 +4702,9 @@
               <a:buChar char="●"/>
               <a:defRPr/>
             </a:lvl7pPr>
-            <a:lvl8pPr marL="3657600" lvl="7" indent="-317500">
-              <a:spcBef>
-                <a:spcPts val="1600"/>
+            <a:lvl8pPr marL="3866449" lvl="7" indent="-335629">
+              <a:spcBef>
+                <a:spcPts val="1691"/>
               </a:spcBef>
               <a:spcAft>
                 <a:spcPts val="0"/>
@@ -4834,12 +4713,12 @@
               <a:buChar char="○"/>
               <a:defRPr/>
             </a:lvl8pPr>
-            <a:lvl9pPr marL="4114800" lvl="8" indent="-317500">
-              <a:spcBef>
-                <a:spcPts val="1600"/>
-              </a:spcBef>
-              <a:spcAft>
-                <a:spcPts val="1600"/>
+            <a:lvl9pPr marL="4349755" lvl="8" indent="-335629">
+              <a:spcBef>
+                <a:spcPts val="1691"/>
+              </a:spcBef>
+              <a:spcAft>
+                <a:spcPts val="1691"/>
               </a:spcAft>
               <a:buSzPts val="1400"/>
               <a:buChar char="■"/>
@@ -4863,15 +4742,15 @@
         </p:nvSpPr>
         <p:spPr>
           <a:xfrm>
-            <a:off x="8472458" y="4663217"/>
-            <a:ext cx="548700" cy="393600"/>
+            <a:off x="8896081" y="6632131"/>
+            <a:ext cx="576135" cy="559787"/>
           </a:xfrm>
           <a:prstGeom prst="rect">
             <a:avLst/>
           </a:prstGeom>
         </p:spPr>
         <p:txBody>
-          <a:bodyPr spcFirstLastPara="1" wrap="square" lIns="91425" tIns="91425" rIns="91425" bIns="91425" anchor="ctr" anchorCtr="0">
+          <a:bodyPr spcFirstLastPara="1" wrap="square" lIns="96645" tIns="96645" rIns="96645" bIns="96645" anchor="ctr" anchorCtr="0">
             <a:noAutofit/>
           </a:bodyPr>
           <a:lstStyle>
@@ -4913,20 +4792,12 @@
             </a:lvl9pPr>
           </a:lstStyle>
           <a:p>
-            <a:pPr marL="0" lvl="0" indent="0">
-              <a:spcBef>
-                <a:spcPts val="0"/>
-              </a:spcBef>
-              <a:spcAft>
-                <a:spcPts val="0"/>
-              </a:spcAft>
-              <a:buNone/>
-            </a:pPr>
             <a:fld id="{00000000-1234-1234-1234-123412341234}" type="slidenum">
-              <a:rPr lang="en"/>
+              <a:rPr lang="en" smtClean="0"/>
+              <a:pPr/>
               <a:t>‹#›</a:t>
             </a:fld>
-            <a:endParaRPr/>
+            <a:endParaRPr lang="en"/>
           </a:p>
         </p:txBody>
       </p:sp>
@@ -4967,17 +4838,17 @@
         </p:nvSpPr>
         <p:spPr>
           <a:xfrm>
-            <a:off x="311700" y="4230575"/>
-            <a:ext cx="5998800" cy="605100"/>
+            <a:off x="327285" y="6016818"/>
+            <a:ext cx="6298740" cy="860587"/>
           </a:xfrm>
           <a:prstGeom prst="rect">
             <a:avLst/>
           </a:prstGeom>
         </p:spPr>
         <p:txBody>
-          <a:bodyPr spcFirstLastPara="1" wrap="square" lIns="91425" tIns="91425" rIns="91425" bIns="91425" anchor="ctr" anchorCtr="0"/>
+          <a:bodyPr spcFirstLastPara="1" wrap="square" lIns="96645" tIns="96645" rIns="96645" bIns="96645" anchor="ctr" anchorCtr="0"/>
           <a:lstStyle>
-            <a:lvl1pPr marL="457200" lvl="0" indent="-228600">
+            <a:lvl1pPr marL="483306" lvl="0" indent="-241653">
               <a:lnSpc>
                 <a:spcPct val="100000"/>
               </a:lnSpc>
@@ -5009,15 +4880,15 @@
         </p:nvSpPr>
         <p:spPr>
           <a:xfrm>
-            <a:off x="8472458" y="4663217"/>
-            <a:ext cx="548700" cy="393600"/>
+            <a:off x="8896081" y="6632131"/>
+            <a:ext cx="576135" cy="559787"/>
           </a:xfrm>
           <a:prstGeom prst="rect">
             <a:avLst/>
           </a:prstGeom>
         </p:spPr>
         <p:txBody>
-          <a:bodyPr spcFirstLastPara="1" wrap="square" lIns="91425" tIns="91425" rIns="91425" bIns="91425" anchor="ctr" anchorCtr="0">
+          <a:bodyPr spcFirstLastPara="1" wrap="square" lIns="96645" tIns="96645" rIns="96645" bIns="96645" anchor="ctr" anchorCtr="0">
             <a:noAutofit/>
           </a:bodyPr>
           <a:lstStyle>
@@ -5059,20 +4930,12 @@
             </a:lvl9pPr>
           </a:lstStyle>
           <a:p>
-            <a:pPr marL="0" lvl="0" indent="0">
-              <a:spcBef>
-                <a:spcPts val="0"/>
-              </a:spcBef>
-              <a:spcAft>
-                <a:spcPts val="0"/>
-              </a:spcAft>
-              <a:buNone/>
-            </a:pPr>
             <a:fld id="{00000000-1234-1234-1234-123412341234}" type="slidenum">
-              <a:rPr lang="en"/>
+              <a:rPr lang="en" smtClean="0"/>
+              <a:pPr/>
               <a:t>‹#›</a:t>
             </a:fld>
-            <a:endParaRPr/>
+            <a:endParaRPr lang="en"/>
           </a:p>
         </p:txBody>
       </p:sp>
@@ -5121,8 +4984,8 @@
         </p:nvSpPr>
         <p:spPr>
           <a:xfrm>
-            <a:off x="311700" y="445025"/>
-            <a:ext cx="8520600" cy="572700"/>
+            <a:off x="327285" y="632925"/>
+            <a:ext cx="8946630" cy="814507"/>
           </a:xfrm>
           <a:prstGeom prst="rect">
             <a:avLst/>
@@ -5133,7 +4996,7 @@
           </a:ln>
         </p:spPr>
         <p:txBody>
-          <a:bodyPr spcFirstLastPara="1" wrap="square" lIns="91425" tIns="91425" rIns="91425" bIns="91425" anchor="t" anchorCtr="0"/>
+          <a:bodyPr spcFirstLastPara="1" wrap="square" lIns="96645" tIns="96645" rIns="96645" bIns="96645" anchor="t" anchorCtr="0"/>
           <a:lstStyle>
             <a:lvl1pPr lvl="0">
               <a:spcBef>
@@ -5315,8 +5178,8 @@
         </p:nvSpPr>
         <p:spPr>
           <a:xfrm>
-            <a:off x="311700" y="1152475"/>
-            <a:ext cx="8520600" cy="3416400"/>
+            <a:off x="327285" y="1639075"/>
+            <a:ext cx="8946630" cy="4858880"/>
           </a:xfrm>
           <a:prstGeom prst="rect">
             <a:avLst/>
@@ -5327,7 +5190,7 @@
           </a:ln>
         </p:spPr>
         <p:txBody>
-          <a:bodyPr spcFirstLastPara="1" wrap="square" lIns="91425" tIns="91425" rIns="91425" bIns="91425" anchor="t" anchorCtr="0"/>
+          <a:bodyPr spcFirstLastPara="1" wrap="square" lIns="96645" tIns="96645" rIns="96645" bIns="96645" anchor="t" anchorCtr="0"/>
           <a:lstStyle>
             <a:lvl1pPr marL="457200" lvl="0" indent="-342900">
               <a:lnSpc>
@@ -5536,8 +5399,8 @@
         </p:nvSpPr>
         <p:spPr>
           <a:xfrm>
-            <a:off x="8472458" y="4663217"/>
-            <a:ext cx="548700" cy="393600"/>
+            <a:off x="8896081" y="6632131"/>
+            <a:ext cx="576135" cy="559787"/>
           </a:xfrm>
           <a:prstGeom prst="rect">
             <a:avLst/>
@@ -5548,13 +5411,13 @@
           </a:ln>
         </p:spPr>
         <p:txBody>
-          <a:bodyPr spcFirstLastPara="1" wrap="square" lIns="91425" tIns="91425" rIns="91425" bIns="91425" anchor="ctr" anchorCtr="0">
+          <a:bodyPr spcFirstLastPara="1" wrap="square" lIns="96645" tIns="96645" rIns="96645" bIns="96645" anchor="ctr" anchorCtr="0">
             <a:noAutofit/>
           </a:bodyPr>
           <a:lstStyle>
             <a:lvl1pPr lvl="0" algn="r">
               <a:buNone/>
-              <a:defRPr sz="1000">
+              <a:defRPr sz="1100">
                 <a:solidFill>
                   <a:schemeClr val="dk2"/>
                 </a:solidFill>
@@ -5562,7 +5425,7 @@
             </a:lvl1pPr>
             <a:lvl2pPr lvl="1" algn="r">
               <a:buNone/>
-              <a:defRPr sz="1000">
+              <a:defRPr sz="1100">
                 <a:solidFill>
                   <a:schemeClr val="dk2"/>
                 </a:solidFill>
@@ -5570,7 +5433,7 @@
             </a:lvl2pPr>
             <a:lvl3pPr lvl="2" algn="r">
               <a:buNone/>
-              <a:defRPr sz="1000">
+              <a:defRPr sz="1100">
                 <a:solidFill>
                   <a:schemeClr val="dk2"/>
                 </a:solidFill>
@@ -5578,7 +5441,7 @@
             </a:lvl3pPr>
             <a:lvl4pPr lvl="3" algn="r">
               <a:buNone/>
-              <a:defRPr sz="1000">
+              <a:defRPr sz="1100">
                 <a:solidFill>
                   <a:schemeClr val="dk2"/>
                 </a:solidFill>
@@ -5586,7 +5449,7 @@
             </a:lvl4pPr>
             <a:lvl5pPr lvl="4" algn="r">
               <a:buNone/>
-              <a:defRPr sz="1000">
+              <a:defRPr sz="1100">
                 <a:solidFill>
                   <a:schemeClr val="dk2"/>
                 </a:solidFill>
@@ -5594,7 +5457,7 @@
             </a:lvl5pPr>
             <a:lvl6pPr lvl="5" algn="r">
               <a:buNone/>
-              <a:defRPr sz="1000">
+              <a:defRPr sz="1100">
                 <a:solidFill>
                   <a:schemeClr val="dk2"/>
                 </a:solidFill>
@@ -5602,7 +5465,7 @@
             </a:lvl6pPr>
             <a:lvl7pPr lvl="6" algn="r">
               <a:buNone/>
-              <a:defRPr sz="1000">
+              <a:defRPr sz="1100">
                 <a:solidFill>
                   <a:schemeClr val="dk2"/>
                 </a:solidFill>
@@ -5610,7 +5473,7 @@
             </a:lvl7pPr>
             <a:lvl8pPr lvl="7" algn="r">
               <a:buNone/>
-              <a:defRPr sz="1000">
+              <a:defRPr sz="1100">
                 <a:solidFill>
                   <a:schemeClr val="dk2"/>
                 </a:solidFill>
@@ -5618,7 +5481,7 @@
             </a:lvl8pPr>
             <a:lvl9pPr lvl="8" algn="r">
               <a:buNone/>
-              <a:defRPr sz="1000">
+              <a:defRPr sz="1100">
                 <a:solidFill>
                   <a:schemeClr val="dk2"/>
                 </a:solidFill>
@@ -5626,20 +5489,12 @@
             </a:lvl9pPr>
           </a:lstStyle>
           <a:p>
-            <a:pPr marL="0" lvl="0" indent="0">
-              <a:spcBef>
-                <a:spcPts val="0"/>
-              </a:spcBef>
-              <a:spcAft>
-                <a:spcPts val="0"/>
-              </a:spcAft>
-              <a:buNone/>
-            </a:pPr>
             <a:fld id="{00000000-1234-1234-1234-123412341234}" type="slidenum">
-              <a:rPr lang="en"/>
+              <a:rPr lang="en" smtClean="0"/>
+              <a:pPr/>
               <a:t>‹#›</a:t>
             </a:fld>
-            <a:endParaRPr/>
+            <a:endParaRPr lang="en"/>
           </a:p>
         </p:txBody>
       </p:sp>
@@ -5659,7 +5514,7 @@
     <p:sldLayoutId id="2147483657" r:id="rId10"/>
     <p:sldLayoutId id="2147483658" r:id="rId11"/>
   </p:sldLayoutIdLst>
-  <p:hf sldNum="0" hdr="0" ftr="0" dt="0"/>
+  <p:hf hdr="0" ftr="0" dt="0"/>
   <p:txStyles>
     <p:titleStyle>
       <a:defPPr marR="0" lvl="0" algn="l" rtl="0">
@@ -5687,7 +5542,7 @@
           <a:srgbClr val="000000"/>
         </a:buClr>
         <a:buFont typeface="Arial"/>
-        <a:defRPr sz="1400" b="0" i="0" u="none" strike="noStrike" cap="none">
+        <a:defRPr sz="1500" b="0" i="0" u="none" strike="noStrike" cap="none">
           <a:solidFill>
             <a:srgbClr val="000000"/>
           </a:solidFill>
@@ -5711,7 +5566,7 @@
           <a:srgbClr val="000000"/>
         </a:buClr>
         <a:buFont typeface="Arial"/>
-        <a:defRPr sz="1400" b="0" i="0" u="none" strike="noStrike" cap="none">
+        <a:defRPr sz="1500" b="0" i="0" u="none" strike="noStrike" cap="none">
           <a:solidFill>
             <a:srgbClr val="000000"/>
           </a:solidFill>
@@ -5735,7 +5590,7 @@
           <a:srgbClr val="000000"/>
         </a:buClr>
         <a:buFont typeface="Arial"/>
-        <a:defRPr sz="1400" b="0" i="0" u="none" strike="noStrike" cap="none">
+        <a:defRPr sz="1500" b="0" i="0" u="none" strike="noStrike" cap="none">
           <a:solidFill>
             <a:srgbClr val="000000"/>
           </a:solidFill>
@@ -5759,7 +5614,7 @@
           <a:srgbClr val="000000"/>
         </a:buClr>
         <a:buFont typeface="Arial"/>
-        <a:defRPr sz="1400" b="0" i="0" u="none" strike="noStrike" cap="none">
+        <a:defRPr sz="1500" b="0" i="0" u="none" strike="noStrike" cap="none">
           <a:solidFill>
             <a:srgbClr val="000000"/>
           </a:solidFill>
@@ -5783,7 +5638,7 @@
           <a:srgbClr val="000000"/>
         </a:buClr>
         <a:buFont typeface="Arial"/>
-        <a:defRPr sz="1400" b="0" i="0" u="none" strike="noStrike" cap="none">
+        <a:defRPr sz="1500" b="0" i="0" u="none" strike="noStrike" cap="none">
           <a:solidFill>
             <a:srgbClr val="000000"/>
           </a:solidFill>
@@ -5807,7 +5662,7 @@
           <a:srgbClr val="000000"/>
         </a:buClr>
         <a:buFont typeface="Arial"/>
-        <a:defRPr sz="1400" b="0" i="0" u="none" strike="noStrike" cap="none">
+        <a:defRPr sz="1500" b="0" i="0" u="none" strike="noStrike" cap="none">
           <a:solidFill>
             <a:srgbClr val="000000"/>
           </a:solidFill>
@@ -5831,7 +5686,7 @@
           <a:srgbClr val="000000"/>
         </a:buClr>
         <a:buFont typeface="Arial"/>
-        <a:defRPr sz="1400" b="0" i="0" u="none" strike="noStrike" cap="none">
+        <a:defRPr sz="1500" b="0" i="0" u="none" strike="noStrike" cap="none">
           <a:solidFill>
             <a:srgbClr val="000000"/>
           </a:solidFill>
@@ -5855,7 +5710,7 @@
           <a:srgbClr val="000000"/>
         </a:buClr>
         <a:buFont typeface="Arial"/>
-        <a:defRPr sz="1400" b="0" i="0" u="none" strike="noStrike" cap="none">
+        <a:defRPr sz="1500" b="0" i="0" u="none" strike="noStrike" cap="none">
           <a:solidFill>
             <a:srgbClr val="000000"/>
           </a:solidFill>
@@ -5879,7 +5734,7 @@
           <a:srgbClr val="000000"/>
         </a:buClr>
         <a:buFont typeface="Arial"/>
-        <a:defRPr sz="1400" b="0" i="0" u="none" strike="noStrike" cap="none">
+        <a:defRPr sz="1500" b="0" i="0" u="none" strike="noStrike" cap="none">
           <a:solidFill>
             <a:srgbClr val="000000"/>
           </a:solidFill>
@@ -5916,7 +5771,7 @@
           <a:srgbClr val="000000"/>
         </a:buClr>
         <a:buFont typeface="Arial"/>
-        <a:defRPr sz="1400" b="0" i="0" u="none" strike="noStrike" cap="none">
+        <a:defRPr sz="1500" b="0" i="0" u="none" strike="noStrike" cap="none">
           <a:solidFill>
             <a:srgbClr val="000000"/>
           </a:solidFill>
@@ -5940,7 +5795,7 @@
           <a:srgbClr val="000000"/>
         </a:buClr>
         <a:buFont typeface="Arial"/>
-        <a:defRPr sz="1400" b="0" i="0" u="none" strike="noStrike" cap="none">
+        <a:defRPr sz="1500" b="0" i="0" u="none" strike="noStrike" cap="none">
           <a:solidFill>
             <a:srgbClr val="000000"/>
           </a:solidFill>
@@ -5964,7 +5819,7 @@
           <a:srgbClr val="000000"/>
         </a:buClr>
         <a:buFont typeface="Arial"/>
-        <a:defRPr sz="1400" b="0" i="0" u="none" strike="noStrike" cap="none">
+        <a:defRPr sz="1500" b="0" i="0" u="none" strike="noStrike" cap="none">
           <a:solidFill>
             <a:srgbClr val="000000"/>
           </a:solidFill>
@@ -5988,7 +5843,7 @@
           <a:srgbClr val="000000"/>
         </a:buClr>
         <a:buFont typeface="Arial"/>
-        <a:defRPr sz="1400" b="0" i="0" u="none" strike="noStrike" cap="none">
+        <a:defRPr sz="1500" b="0" i="0" u="none" strike="noStrike" cap="none">
           <a:solidFill>
             <a:srgbClr val="000000"/>
           </a:solidFill>
@@ -6012,7 +5867,7 @@
           <a:srgbClr val="000000"/>
         </a:buClr>
         <a:buFont typeface="Arial"/>
-        <a:defRPr sz="1400" b="0" i="0" u="none" strike="noStrike" cap="none">
+        <a:defRPr sz="1500" b="0" i="0" u="none" strike="noStrike" cap="none">
           <a:solidFill>
             <a:srgbClr val="000000"/>
           </a:solidFill>
@@ -6036,7 +5891,7 @@
           <a:srgbClr val="000000"/>
         </a:buClr>
         <a:buFont typeface="Arial"/>
-        <a:defRPr sz="1400" b="0" i="0" u="none" strike="noStrike" cap="none">
+        <a:defRPr sz="1500" b="0" i="0" u="none" strike="noStrike" cap="none">
           <a:solidFill>
             <a:srgbClr val="000000"/>
           </a:solidFill>
@@ -6060,7 +5915,7 @@
           <a:srgbClr val="000000"/>
         </a:buClr>
         <a:buFont typeface="Arial"/>
-        <a:defRPr sz="1400" b="0" i="0" u="none" strike="noStrike" cap="none">
+        <a:defRPr sz="1500" b="0" i="0" u="none" strike="noStrike" cap="none">
           <a:solidFill>
             <a:srgbClr val="000000"/>
           </a:solidFill>
@@ -6084,7 +5939,7 @@
           <a:srgbClr val="000000"/>
         </a:buClr>
         <a:buFont typeface="Arial"/>
-        <a:defRPr sz="1400" b="0" i="0" u="none" strike="noStrike" cap="none">
+        <a:defRPr sz="1500" b="0" i="0" u="none" strike="noStrike" cap="none">
           <a:solidFill>
             <a:srgbClr val="000000"/>
           </a:solidFill>
@@ -6108,7 +5963,7 @@
           <a:srgbClr val="000000"/>
         </a:buClr>
         <a:buFont typeface="Arial"/>
-        <a:defRPr sz="1400" b="0" i="0" u="none" strike="noStrike" cap="none">
+        <a:defRPr sz="1500" b="0" i="0" u="none" strike="noStrike" cap="none">
           <a:solidFill>
             <a:srgbClr val="000000"/>
           </a:solidFill>
@@ -6145,7 +6000,7 @@
           <a:srgbClr val="000000"/>
         </a:buClr>
         <a:buFont typeface="Arial"/>
-        <a:defRPr sz="1400" b="0" i="0" u="none" strike="noStrike" cap="none">
+        <a:defRPr sz="1500" b="0" i="0" u="none" strike="noStrike" cap="none">
           <a:solidFill>
             <a:srgbClr val="000000"/>
           </a:solidFill>
@@ -6169,7 +6024,7 @@
           <a:srgbClr val="000000"/>
         </a:buClr>
         <a:buFont typeface="Arial"/>
-        <a:defRPr sz="1400" b="0" i="0" u="none" strike="noStrike" cap="none">
+        <a:defRPr sz="1500" b="0" i="0" u="none" strike="noStrike" cap="none">
           <a:solidFill>
             <a:srgbClr val="000000"/>
           </a:solidFill>
@@ -6193,7 +6048,7 @@
           <a:srgbClr val="000000"/>
         </a:buClr>
         <a:buFont typeface="Arial"/>
-        <a:defRPr sz="1400" b="0" i="0" u="none" strike="noStrike" cap="none">
+        <a:defRPr sz="1500" b="0" i="0" u="none" strike="noStrike" cap="none">
           <a:solidFill>
             <a:srgbClr val="000000"/>
           </a:solidFill>
@@ -6217,7 +6072,7 @@
           <a:srgbClr val="000000"/>
         </a:buClr>
         <a:buFont typeface="Arial"/>
-        <a:defRPr sz="1400" b="0" i="0" u="none" strike="noStrike" cap="none">
+        <a:defRPr sz="1500" b="0" i="0" u="none" strike="noStrike" cap="none">
           <a:solidFill>
             <a:srgbClr val="000000"/>
           </a:solidFill>
@@ -6241,7 +6096,7 @@
           <a:srgbClr val="000000"/>
         </a:buClr>
         <a:buFont typeface="Arial"/>
-        <a:defRPr sz="1400" b="0" i="0" u="none" strike="noStrike" cap="none">
+        <a:defRPr sz="1500" b="0" i="0" u="none" strike="noStrike" cap="none">
           <a:solidFill>
             <a:srgbClr val="000000"/>
           </a:solidFill>
@@ -6265,7 +6120,7 @@
           <a:srgbClr val="000000"/>
         </a:buClr>
         <a:buFont typeface="Arial"/>
-        <a:defRPr sz="1400" b="0" i="0" u="none" strike="noStrike" cap="none">
+        <a:defRPr sz="1500" b="0" i="0" u="none" strike="noStrike" cap="none">
           <a:solidFill>
             <a:srgbClr val="000000"/>
           </a:solidFill>
@@ -6289,7 +6144,7 @@
           <a:srgbClr val="000000"/>
         </a:buClr>
         <a:buFont typeface="Arial"/>
-        <a:defRPr sz="1400" b="0" i="0" u="none" strike="noStrike" cap="none">
+        <a:defRPr sz="1500" b="0" i="0" u="none" strike="noStrike" cap="none">
           <a:solidFill>
             <a:srgbClr val="000000"/>
           </a:solidFill>
@@ -6313,7 +6168,7 @@
           <a:srgbClr val="000000"/>
         </a:buClr>
         <a:buFont typeface="Arial"/>
-        <a:defRPr sz="1400" b="0" i="0" u="none" strike="noStrike" cap="none">
+        <a:defRPr sz="1500" b="0" i="0" u="none" strike="noStrike" cap="none">
           <a:solidFill>
             <a:srgbClr val="000000"/>
           </a:solidFill>
@@ -6337,7 +6192,7 @@
           <a:srgbClr val="000000"/>
         </a:buClr>
         <a:buFont typeface="Arial"/>
-        <a:defRPr sz="1400" b="0" i="0" u="none" strike="noStrike" cap="none">
+        <a:defRPr sz="1500" b="0" i="0" u="none" strike="noStrike" cap="none">
           <a:solidFill>
             <a:srgbClr val="000000"/>
           </a:solidFill>
@@ -6381,28 +6236,19 @@
         </p:nvSpPr>
         <p:spPr>
           <a:xfrm>
-            <a:off x="311708" y="744575"/>
-            <a:ext cx="8520600" cy="2052600"/>
+            <a:off x="327293" y="1058952"/>
+            <a:ext cx="8946630" cy="2919253"/>
           </a:xfrm>
           <a:prstGeom prst="rect">
             <a:avLst/>
           </a:prstGeom>
         </p:spPr>
         <p:txBody>
-          <a:bodyPr spcFirstLastPara="1" wrap="square" lIns="91425" tIns="91425" rIns="91425" bIns="91425" anchor="b" anchorCtr="0">
+          <a:bodyPr spcFirstLastPara="1" wrap="square" lIns="96645" tIns="96645" rIns="96645" bIns="96645" anchor="b" anchorCtr="0">
             <a:noAutofit/>
           </a:bodyPr>
           <a:lstStyle/>
           <a:p>
-            <a:pPr marL="0" lvl="0" indent="0">
-              <a:spcBef>
-                <a:spcPts val="0"/>
-              </a:spcBef>
-              <a:spcAft>
-                <a:spcPts val="0"/>
-              </a:spcAft>
-              <a:buNone/>
-            </a:pPr>
             <a:r>
               <a:rPr lang="en"/>
               <a:t>DIY Battery</a:t>
@@ -6423,43 +6269,27 @@
         </p:nvSpPr>
         <p:spPr>
           <a:xfrm>
-            <a:off x="311700" y="2834124"/>
-            <a:ext cx="8520600" cy="1259703"/>
+            <a:off x="327285" y="4030755"/>
+            <a:ext cx="8946630" cy="1791578"/>
           </a:xfrm>
           <a:prstGeom prst="rect">
             <a:avLst/>
           </a:prstGeom>
         </p:spPr>
         <p:txBody>
-          <a:bodyPr spcFirstLastPara="1" wrap="square" lIns="91425" tIns="91425" rIns="91425" bIns="91425" anchor="t" anchorCtr="0">
+          <a:bodyPr spcFirstLastPara="1" wrap="square" lIns="96645" tIns="96645" rIns="96645" bIns="96645" anchor="t" anchorCtr="0">
             <a:noAutofit/>
           </a:bodyPr>
           <a:lstStyle/>
           <a:p>
-            <a:pPr marL="0" lvl="0" indent="0">
-              <a:spcBef>
-                <a:spcPts val="0"/>
-              </a:spcBef>
-              <a:spcAft>
-                <a:spcPts val="0"/>
-              </a:spcAft>
-              <a:buNone/>
-            </a:pPr>
+            <a:pPr marL="0" indent="0"/>
             <a:r>
               <a:rPr lang="en" dirty="0"/>
               <a:t>The League of Amazing Programmers</a:t>
             </a:r>
           </a:p>
           <a:p>
-            <a:pPr marL="0" lvl="0" indent="0">
-              <a:spcBef>
-                <a:spcPts val="0"/>
-              </a:spcBef>
-              <a:spcAft>
-                <a:spcPts val="0"/>
-              </a:spcAft>
-              <a:buNone/>
-            </a:pPr>
+            <a:pPr marL="0" indent="0"/>
             <a:r>
               <a:rPr lang="en" dirty="0"/>
               <a:t>EE Class – Level 1</a:t>
@@ -6484,8 +6314,8 @@
         </p:blipFill>
         <p:spPr>
           <a:xfrm>
-            <a:off x="431600" y="435075"/>
-            <a:ext cx="3825375" cy="1087600"/>
+            <a:off x="453181" y="618774"/>
+            <a:ext cx="4016644" cy="1249133"/>
           </a:xfrm>
           <a:prstGeom prst="rect">
             <a:avLst/>
@@ -6496,6 +6326,30 @@
           </a:ln>
         </p:spPr>
       </p:pic>
+      <p:sp>
+        <p:nvSpPr>
+          <p:cNvPr id="2" name="Slide Number Placeholder 1"/>
+          <p:cNvSpPr>
+            <a:spLocks noGrp="1"/>
+          </p:cNvSpPr>
+          <p:nvPr>
+            <p:ph type="sldNum" idx="12"/>
+          </p:nvPr>
+        </p:nvSpPr>
+        <p:spPr/>
+        <p:txBody>
+          <a:bodyPr/>
+          <a:lstStyle/>
+          <a:p>
+            <a:fld id="{00000000-1234-1234-1234-123412341234}" type="slidenum">
+              <a:rPr lang="en" smtClean="0"/>
+              <a:pPr/>
+              <a:t>1</a:t>
+            </a:fld>
+            <a:endParaRPr lang="en"/>
+          </a:p>
+        </p:txBody>
+      </p:sp>
     </p:spTree>
   </p:cSld>
   <p:clrMapOvr>
@@ -6537,8 +6391,8 @@
         </p:blipFill>
         <p:spPr>
           <a:xfrm>
-            <a:off x="5476699" y="930350"/>
-            <a:ext cx="2892525" cy="3860626"/>
+            <a:off x="5813940" y="1411506"/>
+            <a:ext cx="3037151" cy="4492189"/>
           </a:xfrm>
           <a:prstGeom prst="rect">
             <a:avLst/>
@@ -6561,33 +6415,24 @@
         </p:nvSpPr>
         <p:spPr>
           <a:xfrm>
-            <a:off x="311700" y="445025"/>
-            <a:ext cx="8520600" cy="572700"/>
+            <a:off x="327285" y="632925"/>
+            <a:ext cx="8946630" cy="814507"/>
           </a:xfrm>
           <a:prstGeom prst="rect">
             <a:avLst/>
           </a:prstGeom>
         </p:spPr>
         <p:txBody>
-          <a:bodyPr spcFirstLastPara="1" wrap="square" lIns="91425" tIns="91425" rIns="91425" bIns="91425" anchor="t" anchorCtr="0">
+          <a:bodyPr spcFirstLastPara="1" wrap="square" lIns="96645" tIns="96645" rIns="96645" bIns="96645" anchor="t" anchorCtr="0">
             <a:noAutofit/>
           </a:bodyPr>
           <a:lstStyle/>
           <a:p>
-            <a:pPr marL="0" lvl="0" indent="0">
-              <a:spcBef>
-                <a:spcPts val="0"/>
-              </a:spcBef>
-              <a:spcAft>
-                <a:spcPts val="0"/>
-              </a:spcAft>
-              <a:buNone/>
-            </a:pPr>
             <a:r>
-              <a:rPr lang="en"/>
+              <a:rPr lang="en" dirty="0"/>
               <a:t>Materials</a:t>
             </a:r>
-            <a:endParaRPr/>
+            <a:endParaRPr dirty="0"/>
           </a:p>
         </p:txBody>
       </p:sp>
@@ -6603,29 +6448,19 @@
         </p:nvSpPr>
         <p:spPr>
           <a:xfrm>
-            <a:off x="311700" y="1152475"/>
-            <a:ext cx="8520600" cy="3416400"/>
+            <a:off x="327285" y="1639075"/>
+            <a:ext cx="8946630" cy="4858880"/>
           </a:xfrm>
           <a:prstGeom prst="rect">
             <a:avLst/>
           </a:prstGeom>
         </p:spPr>
         <p:txBody>
-          <a:bodyPr spcFirstLastPara="1" wrap="square" lIns="91425" tIns="91425" rIns="91425" bIns="91425" anchor="t" anchorCtr="0">
+          <a:bodyPr spcFirstLastPara="1" wrap="square" lIns="96645" tIns="96645" rIns="96645" bIns="96645" anchor="t" anchorCtr="0">
             <a:noAutofit/>
           </a:bodyPr>
           <a:lstStyle/>
           <a:p>
-            <a:pPr marL="457200" lvl="0" indent="-342900" rtl="0">
-              <a:spcBef>
-                <a:spcPts val="0"/>
-              </a:spcBef>
-              <a:spcAft>
-                <a:spcPts val="0"/>
-              </a:spcAft>
-              <a:buSzPts val="1800"/>
-              <a:buChar char="●"/>
-            </a:pPr>
             <a:r>
               <a:rPr lang="en"/>
               <a:t>3 dosage cups</a:t>
@@ -6633,16 +6468,6 @@
             <a:endParaRPr/>
           </a:p>
           <a:p>
-            <a:pPr marL="457200" lvl="0" indent="-342900" rtl="0">
-              <a:spcBef>
-                <a:spcPts val="0"/>
-              </a:spcBef>
-              <a:spcAft>
-                <a:spcPts val="0"/>
-              </a:spcAft>
-              <a:buSzPts val="1800"/>
-              <a:buChar char="●"/>
-            </a:pPr>
             <a:r>
               <a:rPr lang="en"/>
               <a:t>½ cup water</a:t>
@@ -6650,16 +6475,6 @@
             <a:endParaRPr/>
           </a:p>
           <a:p>
-            <a:pPr marL="457200" lvl="0" indent="-342900" rtl="0">
-              <a:spcBef>
-                <a:spcPts val="0"/>
-              </a:spcBef>
-              <a:spcAft>
-                <a:spcPts val="0"/>
-              </a:spcAft>
-              <a:buSzPts val="1800"/>
-              <a:buChar char="●"/>
-            </a:pPr>
             <a:r>
               <a:rPr lang="en"/>
               <a:t>½ tsp salt</a:t>
@@ -6667,16 +6482,6 @@
             <a:endParaRPr/>
           </a:p>
           <a:p>
-            <a:pPr marL="457200" lvl="0" indent="-342900" rtl="0">
-              <a:spcBef>
-                <a:spcPts val="0"/>
-              </a:spcBef>
-              <a:spcAft>
-                <a:spcPts val="0"/>
-              </a:spcAft>
-              <a:buSzPts val="1800"/>
-              <a:buChar char="●"/>
-            </a:pPr>
             <a:r>
               <a:rPr lang="en"/>
               <a:t>30 cm long copper tape strip, 6 pcs</a:t>
@@ -6684,16 +6489,6 @@
             <a:endParaRPr/>
           </a:p>
           <a:p>
-            <a:pPr marL="457200" lvl="0" indent="-342900" rtl="0">
-              <a:spcBef>
-                <a:spcPts val="0"/>
-              </a:spcBef>
-              <a:spcAft>
-                <a:spcPts val="0"/>
-              </a:spcAft>
-              <a:buSzPts val="1800"/>
-              <a:buChar char="●"/>
-            </a:pPr>
             <a:r>
               <a:rPr lang="en"/>
               <a:t>30 cm long aluminum tape strip, 6 pcs</a:t>
@@ -6701,16 +6496,6 @@
             <a:endParaRPr/>
           </a:p>
           <a:p>
-            <a:pPr marL="457200" lvl="0" indent="-342900" rtl="0">
-              <a:spcBef>
-                <a:spcPts val="0"/>
-              </a:spcBef>
-              <a:spcAft>
-                <a:spcPts val="0"/>
-              </a:spcAft>
-              <a:buSzPts val="1800"/>
-              <a:buChar char="●"/>
-            </a:pPr>
             <a:r>
               <a:rPr lang="en"/>
               <a:t>Small stones (for weight)</a:t>
@@ -6718,16 +6503,6 @@
             <a:endParaRPr/>
           </a:p>
           <a:p>
-            <a:pPr marL="457200" lvl="0" indent="-342900" rtl="0">
-              <a:spcBef>
-                <a:spcPts val="0"/>
-              </a:spcBef>
-              <a:spcAft>
-                <a:spcPts val="0"/>
-              </a:spcAft>
-              <a:buSzPts val="1800"/>
-              <a:buChar char="●"/>
-            </a:pPr>
             <a:r>
               <a:rPr lang="en"/>
               <a:t>Jumper wires with small alligator clips, 4 pcs</a:t>
@@ -6735,16 +6510,6 @@
             <a:endParaRPr/>
           </a:p>
           <a:p>
-            <a:pPr marL="457200" lvl="0" indent="-342900" rtl="0">
-              <a:spcBef>
-                <a:spcPts val="0"/>
-              </a:spcBef>
-              <a:spcAft>
-                <a:spcPts val="0"/>
-              </a:spcAft>
-              <a:buSzPts val="1800"/>
-              <a:buChar char="●"/>
-            </a:pPr>
             <a:r>
               <a:rPr lang="en"/>
               <a:t>Multimeter</a:t>
@@ -6752,21 +6517,35 @@
             <a:endParaRPr/>
           </a:p>
           <a:p>
-            <a:pPr marL="457200" lvl="0" indent="-342900">
-              <a:spcBef>
-                <a:spcPts val="0"/>
-              </a:spcBef>
-              <a:spcAft>
-                <a:spcPts val="0"/>
-              </a:spcAft>
-              <a:buSzPts val="1800"/>
-              <a:buChar char="●"/>
-            </a:pPr>
             <a:r>
               <a:rPr lang="en"/>
               <a:t>Digital clock with wires</a:t>
             </a:r>
             <a:endParaRPr/>
+          </a:p>
+        </p:txBody>
+      </p:sp>
+      <p:sp>
+        <p:nvSpPr>
+          <p:cNvPr id="2" name="Slide Number Placeholder 1"/>
+          <p:cNvSpPr>
+            <a:spLocks noGrp="1"/>
+          </p:cNvSpPr>
+          <p:nvPr>
+            <p:ph type="sldNum" idx="12"/>
+          </p:nvPr>
+        </p:nvSpPr>
+        <p:spPr/>
+        <p:txBody>
+          <a:bodyPr/>
+          <a:lstStyle/>
+          <a:p>
+            <a:fld id="{00000000-1234-1234-1234-123412341234}" type="slidenum">
+              <a:rPr lang="en" smtClean="0"/>
+              <a:pPr/>
+              <a:t>2</a:t>
+            </a:fld>
+            <a:endParaRPr lang="en"/>
           </a:p>
         </p:txBody>
       </p:sp>
@@ -6807,28 +6586,19 @@
         </p:nvSpPr>
         <p:spPr>
           <a:xfrm>
-            <a:off x="311700" y="445025"/>
-            <a:ext cx="8520600" cy="572700"/>
+            <a:off x="327285" y="632925"/>
+            <a:ext cx="8946630" cy="814507"/>
           </a:xfrm>
           <a:prstGeom prst="rect">
             <a:avLst/>
           </a:prstGeom>
         </p:spPr>
         <p:txBody>
-          <a:bodyPr spcFirstLastPara="1" wrap="square" lIns="91425" tIns="91425" rIns="91425" bIns="91425" anchor="t" anchorCtr="0">
+          <a:bodyPr spcFirstLastPara="1" wrap="square" lIns="96645" tIns="96645" rIns="96645" bIns="96645" anchor="t" anchorCtr="0">
             <a:noAutofit/>
           </a:bodyPr>
           <a:lstStyle/>
           <a:p>
-            <a:pPr marL="0" lvl="0" indent="0">
-              <a:spcBef>
-                <a:spcPts val="0"/>
-              </a:spcBef>
-              <a:spcAft>
-                <a:spcPts val="0"/>
-              </a:spcAft>
-              <a:buNone/>
-            </a:pPr>
             <a:r>
               <a:rPr lang="en"/>
               <a:t>Instructions</a:t>
@@ -6849,26 +6619,20 @@
         </p:nvSpPr>
         <p:spPr>
           <a:xfrm>
-            <a:off x="311700" y="1152475"/>
-            <a:ext cx="8520600" cy="3416400"/>
+            <a:off x="327285" y="1639075"/>
+            <a:ext cx="8946630" cy="4858880"/>
           </a:xfrm>
           <a:prstGeom prst="rect">
             <a:avLst/>
           </a:prstGeom>
         </p:spPr>
         <p:txBody>
-          <a:bodyPr spcFirstLastPara="1" wrap="square" lIns="91425" tIns="91425" rIns="91425" bIns="91425" anchor="t" anchorCtr="0">
+          <a:bodyPr spcFirstLastPara="1" wrap="square" lIns="96645" tIns="96645" rIns="96645" bIns="96645" anchor="t" anchorCtr="0">
             <a:noAutofit/>
           </a:bodyPr>
           <a:lstStyle/>
           <a:p>
-            <a:pPr marL="0" lvl="0" indent="0">
-              <a:spcBef>
-                <a:spcPts val="0"/>
-              </a:spcBef>
-              <a:spcAft>
-                <a:spcPts val="0"/>
-              </a:spcAft>
+            <a:pPr marL="0" indent="0">
               <a:buNone/>
             </a:pPr>
             <a:r>
@@ -6878,15 +6642,10 @@
             <a:endParaRPr b="1" i="1"/>
           </a:p>
           <a:p>
-            <a:pPr marL="457200" lvl="0" indent="-342900" rtl="0">
-              <a:spcBef>
-                <a:spcPts val="1600"/>
-              </a:spcBef>
-              <a:spcAft>
-                <a:spcPts val="0"/>
-              </a:spcAft>
-              <a:buSzPts val="1800"/>
-              <a:buChar char="●"/>
+            <a:pPr>
+              <a:spcBef>
+                <a:spcPts val="1691"/>
+              </a:spcBef>
             </a:pPr>
             <a:r>
               <a:rPr lang="en"/>
@@ -6895,16 +6654,6 @@
             <a:endParaRPr/>
           </a:p>
           <a:p>
-            <a:pPr marL="457200" lvl="0" indent="-342900" rtl="0">
-              <a:spcBef>
-                <a:spcPts val="0"/>
-              </a:spcBef>
-              <a:spcAft>
-                <a:spcPts val="0"/>
-              </a:spcAft>
-              <a:buSzPts val="1800"/>
-              <a:buChar char="●"/>
-            </a:pPr>
             <a:r>
               <a:rPr lang="en"/>
               <a:t>Fold extra tape over the lip of the cup</a:t>
@@ -6912,16 +6661,6 @@
             <a:endParaRPr/>
           </a:p>
           <a:p>
-            <a:pPr marL="457200" lvl="0" indent="-342900" rtl="0">
-              <a:spcBef>
-                <a:spcPts val="0"/>
-              </a:spcBef>
-              <a:spcAft>
-                <a:spcPts val="0"/>
-              </a:spcAft>
-              <a:buSzPts val="1800"/>
-              <a:buChar char="●"/>
-            </a:pPr>
             <a:r>
               <a:rPr lang="en"/>
               <a:t>Wipe metal tape clean to remove oils and other contaminants</a:t>
@@ -6929,16 +6668,6 @@
             <a:endParaRPr/>
           </a:p>
           <a:p>
-            <a:pPr marL="457200" lvl="0" indent="-342900" rtl="0">
-              <a:spcBef>
-                <a:spcPts val="0"/>
-              </a:spcBef>
-              <a:spcAft>
-                <a:spcPts val="0"/>
-              </a:spcAft>
-              <a:buSzPts val="1800"/>
-              <a:buChar char="●"/>
-            </a:pPr>
             <a:r>
               <a:rPr lang="en"/>
               <a:t>Add a small stone or other non-metal weight to help keep it stable</a:t>
@@ -6946,16 +6675,6 @@
             <a:endParaRPr/>
           </a:p>
           <a:p>
-            <a:pPr marL="457200" lvl="0" indent="-342900" rtl="0">
-              <a:spcBef>
-                <a:spcPts val="0"/>
-              </a:spcBef>
-              <a:spcAft>
-                <a:spcPts val="0"/>
-              </a:spcAft>
-              <a:buSzPts val="1800"/>
-              <a:buChar char="●"/>
-            </a:pPr>
             <a:r>
               <a:rPr lang="en"/>
               <a:t>Attach alligator clips and wire together</a:t>
@@ -6963,16 +6682,6 @@
             <a:endParaRPr/>
           </a:p>
           <a:p>
-            <a:pPr marL="457200" lvl="0" indent="-342900" rtl="0">
-              <a:spcBef>
-                <a:spcPts val="0"/>
-              </a:spcBef>
-              <a:spcAft>
-                <a:spcPts val="0"/>
-              </a:spcAft>
-              <a:buSzPts val="1800"/>
-              <a:buChar char="●"/>
-            </a:pPr>
             <a:r>
               <a:rPr lang="en"/>
               <a:t>Make a salt water solution with ½ cup water and ½ to 1 teaspoon of salt</a:t>
@@ -6980,21 +6689,35 @@
             <a:endParaRPr/>
           </a:p>
           <a:p>
-            <a:pPr marL="457200" lvl="0" indent="-342900">
-              <a:spcBef>
-                <a:spcPts val="0"/>
-              </a:spcBef>
-              <a:spcAft>
-                <a:spcPts val="0"/>
-              </a:spcAft>
-              <a:buSzPts val="1800"/>
-              <a:buChar char="●"/>
-            </a:pPr>
             <a:r>
               <a:rPr lang="en"/>
               <a:t>Pour salt solution into cup. Fill ½ to ⅔ to the top.</a:t>
             </a:r>
             <a:endParaRPr/>
+          </a:p>
+        </p:txBody>
+      </p:sp>
+      <p:sp>
+        <p:nvSpPr>
+          <p:cNvPr id="2" name="Slide Number Placeholder 1"/>
+          <p:cNvSpPr>
+            <a:spLocks noGrp="1"/>
+          </p:cNvSpPr>
+          <p:nvPr>
+            <p:ph type="sldNum" idx="12"/>
+          </p:nvPr>
+        </p:nvSpPr>
+        <p:spPr/>
+        <p:txBody>
+          <a:bodyPr/>
+          <a:lstStyle/>
+          <a:p>
+            <a:fld id="{00000000-1234-1234-1234-123412341234}" type="slidenum">
+              <a:rPr lang="en" smtClean="0"/>
+              <a:pPr/>
+              <a:t>3</a:t>
+            </a:fld>
+            <a:endParaRPr lang="en"/>
           </a:p>
         </p:txBody>
       </p:sp>
@@ -7031,8 +6754,8 @@
         </p:nvSpPr>
         <p:spPr>
           <a:xfrm>
-            <a:off x="1604975" y="2581275"/>
-            <a:ext cx="1601475" cy="763350"/>
+            <a:off x="1685225" y="3671147"/>
+            <a:ext cx="1681549" cy="1085653"/>
           </a:xfrm>
           <a:custGeom>
             <a:avLst/>
@@ -7086,28 +6809,19 @@
         </p:nvSpPr>
         <p:spPr>
           <a:xfrm>
-            <a:off x="311700" y="445025"/>
-            <a:ext cx="8520600" cy="572700"/>
+            <a:off x="327285" y="632925"/>
+            <a:ext cx="8946630" cy="814507"/>
           </a:xfrm>
           <a:prstGeom prst="rect">
             <a:avLst/>
           </a:prstGeom>
         </p:spPr>
         <p:txBody>
-          <a:bodyPr spcFirstLastPara="1" wrap="square" lIns="91425" tIns="91425" rIns="91425" bIns="91425" anchor="t" anchorCtr="0">
+          <a:bodyPr spcFirstLastPara="1" wrap="square" lIns="96645" tIns="96645" rIns="96645" bIns="96645" anchor="t" anchorCtr="0">
             <a:noAutofit/>
           </a:bodyPr>
           <a:lstStyle/>
           <a:p>
-            <a:pPr marL="0" lvl="0" indent="0">
-              <a:spcBef>
-                <a:spcPts val="0"/>
-              </a:spcBef>
-              <a:spcAft>
-                <a:spcPts val="0"/>
-              </a:spcAft>
-              <a:buNone/>
-            </a:pPr>
             <a:r>
               <a:rPr lang="en"/>
               <a:t>How to make one cell, about 0.5 Volts</a:t>
@@ -7124,8 +6838,8 @@
         </p:nvSpPr>
         <p:spPr>
           <a:xfrm>
-            <a:off x="1478475" y="2233663"/>
-            <a:ext cx="1887850" cy="1162475"/>
+            <a:off x="1552399" y="3176766"/>
+            <a:ext cx="1982243" cy="1653298"/>
           </a:xfrm>
           <a:custGeom>
             <a:avLst/>
@@ -7170,8 +6884,8 @@
         </p:nvSpPr>
         <p:spPr>
           <a:xfrm>
-            <a:off x="1375500" y="2232388"/>
-            <a:ext cx="461200" cy="1089800"/>
+            <a:off x="1444275" y="3174952"/>
+            <a:ext cx="484260" cy="1549938"/>
           </a:xfrm>
           <a:custGeom>
             <a:avLst/>
@@ -7216,8 +6930,8 @@
         </p:nvSpPr>
         <p:spPr>
           <a:xfrm>
-            <a:off x="3005325" y="2189288"/>
-            <a:ext cx="463875" cy="1143125"/>
+            <a:off x="3155593" y="3113655"/>
+            <a:ext cx="487069" cy="1625778"/>
           </a:xfrm>
           <a:custGeom>
             <a:avLst/>
@@ -7270,8 +6984,8 @@
         </p:blipFill>
         <p:spPr>
           <a:xfrm>
-            <a:off x="5384100" y="1817174"/>
-            <a:ext cx="2744801" cy="2058601"/>
+            <a:off x="5653307" y="2584427"/>
+            <a:ext cx="2882041" cy="2623628"/>
           </a:xfrm>
           <a:prstGeom prst="rect">
             <a:avLst/>
@@ -7290,8 +7004,8 @@
         </p:nvSpPr>
         <p:spPr>
           <a:xfrm>
-            <a:off x="1999513" y="2843125"/>
-            <a:ext cx="843000" cy="489300"/>
+            <a:off x="2099489" y="4043555"/>
+            <a:ext cx="885150" cy="695893"/>
           </a:xfrm>
           <a:prstGeom prst="flowChartAlternateProcess">
             <a:avLst/>
@@ -7310,25 +7024,17 @@
           </a:ln>
         </p:spPr>
         <p:txBody>
-          <a:bodyPr spcFirstLastPara="1" wrap="square" lIns="91425" tIns="91425" rIns="91425" bIns="91425" anchor="ctr" anchorCtr="0">
+          <a:bodyPr spcFirstLastPara="1" wrap="square" lIns="96645" tIns="96645" rIns="96645" bIns="96645" anchor="ctr" anchorCtr="0">
             <a:noAutofit/>
           </a:bodyPr>
           <a:lstStyle/>
           <a:p>
-            <a:pPr marL="0" lvl="0" indent="0" algn="ctr">
-              <a:spcBef>
-                <a:spcPts val="0"/>
-              </a:spcBef>
-              <a:spcAft>
-                <a:spcPts val="0"/>
-              </a:spcAft>
-              <a:buNone/>
-            </a:pPr>
+            <a:pPr algn="ctr"/>
             <a:r>
-              <a:rPr lang="en" sz="1000"/>
+              <a:rPr lang="en" sz="1100"/>
               <a:t>Non-metal weight</a:t>
             </a:r>
-            <a:endParaRPr sz="1000"/>
+            <a:endParaRPr sz="1100"/>
           </a:p>
         </p:txBody>
       </p:sp>
@@ -7340,8 +7046,8 @@
         </p:nvSpPr>
         <p:spPr>
           <a:xfrm>
-            <a:off x="2850650" y="1579500"/>
-            <a:ext cx="1519500" cy="320100"/>
+            <a:off x="2993183" y="2246400"/>
+            <a:ext cx="1595475" cy="455253"/>
           </a:xfrm>
           <a:prstGeom prst="rect">
             <a:avLst/>
@@ -7352,20 +7058,12 @@
           </a:ln>
         </p:spPr>
         <p:txBody>
-          <a:bodyPr spcFirstLastPara="1" wrap="square" lIns="91425" tIns="91425" rIns="91425" bIns="91425" anchor="t" anchorCtr="0">
+          <a:bodyPr spcFirstLastPara="1" wrap="square" lIns="96645" tIns="96645" rIns="96645" bIns="96645" anchor="t" anchorCtr="0">
             <a:noAutofit/>
           </a:bodyPr>
           <a:lstStyle/>
           <a:p>
-            <a:pPr marL="0" lvl="0" indent="0" algn="ctr" rtl="0">
-              <a:spcBef>
-                <a:spcPts val="0"/>
-              </a:spcBef>
-              <a:spcAft>
-                <a:spcPts val="0"/>
-              </a:spcAft>
-              <a:buNone/>
-            </a:pPr>
+            <a:pPr algn="ctr"/>
             <a:r>
               <a:rPr lang="en"/>
               <a:t>Aluminum</a:t>
@@ -7373,15 +7071,7 @@
             <a:endParaRPr/>
           </a:p>
           <a:p>
-            <a:pPr marL="0" lvl="0" indent="0" algn="ctr">
-              <a:spcBef>
-                <a:spcPts val="0"/>
-              </a:spcBef>
-              <a:spcAft>
-                <a:spcPts val="0"/>
-              </a:spcAft>
-              <a:buNone/>
-            </a:pPr>
+            <a:pPr algn="ctr"/>
             <a:r>
               <a:rPr lang="en"/>
               <a:t>tape</a:t>
@@ -7398,8 +7088,8 @@
         </p:nvSpPr>
         <p:spPr>
           <a:xfrm>
-            <a:off x="611325" y="1579500"/>
-            <a:ext cx="1519500" cy="320100"/>
+            <a:off x="641891" y="2246400"/>
+            <a:ext cx="1595475" cy="455253"/>
           </a:xfrm>
           <a:prstGeom prst="rect">
             <a:avLst/>
@@ -7410,20 +7100,12 @@
           </a:ln>
         </p:spPr>
         <p:txBody>
-          <a:bodyPr spcFirstLastPara="1" wrap="square" lIns="91425" tIns="91425" rIns="91425" bIns="91425" anchor="t" anchorCtr="0">
+          <a:bodyPr spcFirstLastPara="1" wrap="square" lIns="96645" tIns="96645" rIns="96645" bIns="96645" anchor="t" anchorCtr="0">
             <a:noAutofit/>
           </a:bodyPr>
           <a:lstStyle/>
           <a:p>
-            <a:pPr marL="0" lvl="0" indent="0" algn="ctr" rtl="0">
-              <a:spcBef>
-                <a:spcPts val="0"/>
-              </a:spcBef>
-              <a:spcAft>
-                <a:spcPts val="0"/>
-              </a:spcAft>
-              <a:buNone/>
-            </a:pPr>
+            <a:pPr algn="ctr"/>
             <a:r>
               <a:rPr lang="en"/>
               <a:t>Copper</a:t>
@@ -7431,15 +7113,7 @@
             <a:endParaRPr/>
           </a:p>
           <a:p>
-            <a:pPr marL="0" lvl="0" indent="0" algn="ctr" rtl="0">
-              <a:spcBef>
-                <a:spcPts val="0"/>
-              </a:spcBef>
-              <a:spcAft>
-                <a:spcPts val="0"/>
-              </a:spcAft>
-              <a:buNone/>
-            </a:pPr>
+            <a:pPr algn="ctr"/>
             <a:r>
               <a:rPr lang="en"/>
               <a:t>tape</a:t>
@@ -7456,8 +7130,8 @@
         </p:nvSpPr>
         <p:spPr>
           <a:xfrm>
-            <a:off x="752150" y="2168850"/>
-            <a:ext cx="563400" cy="805800"/>
+            <a:off x="789758" y="3084587"/>
+            <a:ext cx="591570" cy="1146027"/>
           </a:xfrm>
           <a:prstGeom prst="rect">
             <a:avLst/>
@@ -7468,25 +7142,17 @@
           </a:ln>
         </p:spPr>
         <p:txBody>
-          <a:bodyPr spcFirstLastPara="1" wrap="square" lIns="91425" tIns="91425" rIns="91425" bIns="91425" anchor="t" anchorCtr="0">
+          <a:bodyPr spcFirstLastPara="1" wrap="square" lIns="96645" tIns="96645" rIns="96645" bIns="96645" anchor="t" anchorCtr="0">
             <a:noAutofit/>
           </a:bodyPr>
           <a:lstStyle/>
           <a:p>
-            <a:pPr marL="0" lvl="0" indent="0" algn="ctr">
-              <a:spcBef>
-                <a:spcPts val="0"/>
-              </a:spcBef>
-              <a:spcAft>
-                <a:spcPts val="0"/>
-              </a:spcAft>
-              <a:buNone/>
-            </a:pPr>
+            <a:pPr algn="ctr"/>
             <a:r>
-              <a:rPr lang="en" sz="3600"/>
+              <a:rPr lang="en" sz="3800"/>
               <a:t>+</a:t>
             </a:r>
-            <a:endParaRPr sz="3600"/>
+            <a:endParaRPr sz="3800"/>
           </a:p>
         </p:txBody>
       </p:sp>
@@ -7498,8 +7164,8 @@
         </p:nvSpPr>
         <p:spPr>
           <a:xfrm>
-            <a:off x="3328700" y="2168850"/>
-            <a:ext cx="563400" cy="805800"/>
+            <a:off x="3495135" y="3084587"/>
+            <a:ext cx="591570" cy="1146027"/>
           </a:xfrm>
           <a:prstGeom prst="rect">
             <a:avLst/>
@@ -7510,25 +7176,17 @@
           </a:ln>
         </p:spPr>
         <p:txBody>
-          <a:bodyPr spcFirstLastPara="1" wrap="square" lIns="91425" tIns="91425" rIns="91425" bIns="91425" anchor="t" anchorCtr="0">
+          <a:bodyPr spcFirstLastPara="1" wrap="square" lIns="96645" tIns="96645" rIns="96645" bIns="96645" anchor="t" anchorCtr="0">
             <a:noAutofit/>
           </a:bodyPr>
           <a:lstStyle/>
           <a:p>
-            <a:pPr marL="0" lvl="0" indent="0" algn="ctr" rtl="0">
-              <a:spcBef>
-                <a:spcPts val="0"/>
-              </a:spcBef>
-              <a:spcAft>
-                <a:spcPts val="0"/>
-              </a:spcAft>
-              <a:buNone/>
-            </a:pPr>
+            <a:pPr algn="ctr"/>
             <a:r>
-              <a:rPr lang="en" sz="3600"/>
+              <a:rPr lang="en" sz="3800"/>
               <a:t>-</a:t>
             </a:r>
-            <a:endParaRPr sz="3600"/>
+            <a:endParaRPr sz="3800"/>
           </a:p>
         </p:txBody>
       </p:sp>
@@ -7540,8 +7198,8 @@
         </p:nvSpPr>
         <p:spPr>
           <a:xfrm>
-            <a:off x="1645963" y="2331375"/>
-            <a:ext cx="1519500" cy="320100"/>
+            <a:off x="1728261" y="3315734"/>
+            <a:ext cx="1595475" cy="455253"/>
           </a:xfrm>
           <a:prstGeom prst="rect">
             <a:avLst/>
@@ -7552,25 +7210,41 @@
           </a:ln>
         </p:spPr>
         <p:txBody>
-          <a:bodyPr spcFirstLastPara="1" wrap="square" lIns="91425" tIns="91425" rIns="91425" bIns="91425" anchor="t" anchorCtr="0">
+          <a:bodyPr spcFirstLastPara="1" wrap="square" lIns="96645" tIns="96645" rIns="96645" bIns="96645" anchor="t" anchorCtr="0">
             <a:noAutofit/>
           </a:bodyPr>
           <a:lstStyle/>
           <a:p>
-            <a:pPr marL="0" lvl="0" indent="0" algn="ctr" rtl="0">
-              <a:spcBef>
-                <a:spcPts val="0"/>
-              </a:spcBef>
-              <a:spcAft>
-                <a:spcPts val="0"/>
-              </a:spcAft>
-              <a:buNone/>
-            </a:pPr>
+            <a:pPr algn="ctr"/>
             <a:r>
               <a:rPr lang="en"/>
               <a:t>Salt water</a:t>
             </a:r>
             <a:endParaRPr/>
+          </a:p>
+        </p:txBody>
+      </p:sp>
+      <p:sp>
+        <p:nvSpPr>
+          <p:cNvPr id="2" name="Slide Number Placeholder 1"/>
+          <p:cNvSpPr>
+            <a:spLocks noGrp="1"/>
+          </p:cNvSpPr>
+          <p:nvPr>
+            <p:ph type="sldNum" idx="12"/>
+          </p:nvPr>
+        </p:nvSpPr>
+        <p:spPr/>
+        <p:txBody>
+          <a:bodyPr/>
+          <a:lstStyle/>
+          <a:p>
+            <a:fld id="{00000000-1234-1234-1234-123412341234}" type="slidenum">
+              <a:rPr lang="en" smtClean="0"/>
+              <a:pPr/>
+              <a:t>4</a:t>
+            </a:fld>
+            <a:endParaRPr lang="en"/>
           </a:p>
         </p:txBody>
       </p:sp>
@@ -7611,28 +7285,19 @@
         </p:nvSpPr>
         <p:spPr>
           <a:xfrm>
-            <a:off x="311700" y="445025"/>
-            <a:ext cx="8520600" cy="572700"/>
+            <a:off x="327285" y="632925"/>
+            <a:ext cx="8946630" cy="814507"/>
           </a:xfrm>
           <a:prstGeom prst="rect">
             <a:avLst/>
           </a:prstGeom>
         </p:spPr>
         <p:txBody>
-          <a:bodyPr spcFirstLastPara="1" wrap="square" lIns="91425" tIns="91425" rIns="91425" bIns="91425" anchor="t" anchorCtr="0">
+          <a:bodyPr spcFirstLastPara="1" wrap="square" lIns="96645" tIns="96645" rIns="96645" bIns="96645" anchor="t" anchorCtr="0">
             <a:noAutofit/>
           </a:bodyPr>
           <a:lstStyle/>
           <a:p>
-            <a:pPr marL="0" lvl="0" indent="0">
-              <a:spcBef>
-                <a:spcPts val="0"/>
-              </a:spcBef>
-              <a:spcAft>
-                <a:spcPts val="0"/>
-              </a:spcAft>
-              <a:buNone/>
-            </a:pPr>
             <a:r>
               <a:rPr lang="en"/>
               <a:t>Wire three cells together, about 1.5 Volts!</a:t>
@@ -7649,8 +7314,8 @@
         </p:nvGrpSpPr>
         <p:grpSpPr>
           <a:xfrm>
-            <a:off x="1698488" y="3294150"/>
-            <a:ext cx="1078025" cy="709971"/>
+            <a:off x="1783414" y="4685014"/>
+            <a:ext cx="1131926" cy="1009737"/>
             <a:chOff x="2028600" y="2374400"/>
             <a:chExt cx="1078025" cy="709971"/>
           </a:xfrm>
@@ -7951,8 +7616,8 @@
         </p:nvGrpSpPr>
         <p:grpSpPr>
           <a:xfrm>
-            <a:off x="3421513" y="3294150"/>
-            <a:ext cx="1078025" cy="709971"/>
+            <a:off x="3592590" y="4685014"/>
+            <a:ext cx="1131926" cy="1009737"/>
             <a:chOff x="2028600" y="2374400"/>
             <a:chExt cx="1078025" cy="709971"/>
           </a:xfrm>
@@ -8253,8 +7918,8 @@
         </p:nvGrpSpPr>
         <p:grpSpPr>
           <a:xfrm>
-            <a:off x="5144538" y="3294150"/>
-            <a:ext cx="1078025" cy="709971"/>
+            <a:off x="5401767" y="4685014"/>
+            <a:ext cx="1131926" cy="1009737"/>
             <a:chOff x="2028600" y="2374400"/>
             <a:chExt cx="1078025" cy="709971"/>
           </a:xfrm>
@@ -8555,8 +8220,8 @@
         </p:nvSpPr>
         <p:spPr>
           <a:xfrm>
-            <a:off x="2757575" y="2944792"/>
-            <a:ext cx="719375" cy="400275"/>
+            <a:off x="2895455" y="4188149"/>
+            <a:ext cx="755344" cy="569280"/>
           </a:xfrm>
           <a:custGeom>
             <a:avLst/>
@@ -8607,8 +8272,8 @@
         </p:nvSpPr>
         <p:spPr>
           <a:xfrm>
-            <a:off x="4499550" y="2944792"/>
-            <a:ext cx="719375" cy="400275"/>
+            <a:off x="4724529" y="4188149"/>
+            <a:ext cx="755344" cy="569280"/>
           </a:xfrm>
           <a:custGeom>
             <a:avLst/>
@@ -8659,8 +8324,8 @@
         </p:nvSpPr>
         <p:spPr>
           <a:xfrm>
-            <a:off x="6618200" y="1769050"/>
-            <a:ext cx="1498800" cy="710100"/>
+            <a:off x="6949110" y="2515982"/>
+            <a:ext cx="1573740" cy="1009920"/>
           </a:xfrm>
           <a:prstGeom prst="roundRect">
             <a:avLst>
@@ -8681,25 +8346,17 @@
           </a:ln>
         </p:spPr>
         <p:txBody>
-          <a:bodyPr spcFirstLastPara="1" wrap="square" lIns="91425" tIns="91425" rIns="91425" bIns="91425" anchor="ctr" anchorCtr="0">
+          <a:bodyPr spcFirstLastPara="1" wrap="square" lIns="96645" tIns="96645" rIns="96645" bIns="96645" anchor="ctr" anchorCtr="0">
             <a:noAutofit/>
           </a:bodyPr>
           <a:lstStyle/>
           <a:p>
-            <a:pPr marL="0" lvl="0" indent="0" algn="ctr">
-              <a:spcBef>
-                <a:spcPts val="0"/>
-              </a:spcBef>
-              <a:spcAft>
-                <a:spcPts val="0"/>
-              </a:spcAft>
-              <a:buNone/>
-            </a:pPr>
+            <a:pPr algn="ctr"/>
             <a:r>
-              <a:rPr lang="en" sz="3000" i="1"/>
-              <a:t>12:00</a:t>
+              <a:rPr lang="en" sz="3200" i="1" dirty="0"/>
+              <a:t>1.500</a:t>
             </a:r>
-            <a:endParaRPr sz="3000" i="1"/>
+            <a:endParaRPr sz="3200" i="1" dirty="0"/>
           </a:p>
         </p:txBody>
       </p:sp>
@@ -8711,8 +8368,8 @@
         </p:nvSpPr>
         <p:spPr>
           <a:xfrm>
-            <a:off x="1646193" y="1807927"/>
-            <a:ext cx="4960025" cy="1477200"/>
+            <a:off x="1728504" y="2571273"/>
+            <a:ext cx="5208026" cy="2100907"/>
           </a:xfrm>
           <a:custGeom>
             <a:avLst/>
@@ -8768,8 +8425,8 @@
         </p:nvSpPr>
         <p:spPr>
           <a:xfrm>
-            <a:off x="5970775" y="2278000"/>
-            <a:ext cx="659425" cy="1055075"/>
+            <a:off x="6269315" y="3239824"/>
+            <a:ext cx="692396" cy="1500551"/>
           </a:xfrm>
           <a:custGeom>
             <a:avLst/>
@@ -8825,8 +8482,8 @@
         </p:nvSpPr>
         <p:spPr>
           <a:xfrm>
-            <a:off x="5659175" y="1401525"/>
-            <a:ext cx="563400" cy="805800"/>
+            <a:off x="5942134" y="1993280"/>
+            <a:ext cx="591570" cy="1146027"/>
           </a:xfrm>
           <a:prstGeom prst="rect">
             <a:avLst/>
@@ -8837,25 +8494,17 @@
           </a:ln>
         </p:spPr>
         <p:txBody>
-          <a:bodyPr spcFirstLastPara="1" wrap="square" lIns="91425" tIns="91425" rIns="91425" bIns="91425" anchor="t" anchorCtr="0">
+          <a:bodyPr spcFirstLastPara="1" wrap="square" lIns="96645" tIns="96645" rIns="96645" bIns="96645" anchor="t" anchorCtr="0">
             <a:noAutofit/>
           </a:bodyPr>
           <a:lstStyle/>
           <a:p>
-            <a:pPr marL="0" lvl="0" indent="0" algn="ctr" rtl="0">
-              <a:spcBef>
-                <a:spcPts val="0"/>
-              </a:spcBef>
-              <a:spcAft>
-                <a:spcPts val="0"/>
-              </a:spcAft>
-              <a:buNone/>
-            </a:pPr>
+            <a:pPr algn="ctr"/>
             <a:r>
-              <a:rPr lang="en" sz="3600"/>
+              <a:rPr lang="en" sz="3800"/>
               <a:t>+</a:t>
             </a:r>
-            <a:endParaRPr sz="3600"/>
+            <a:endParaRPr sz="3800"/>
           </a:p>
         </p:txBody>
       </p:sp>
@@ -8867,8 +8516,8 @@
         </p:nvSpPr>
         <p:spPr>
           <a:xfrm>
-            <a:off x="5659175" y="2009525"/>
-            <a:ext cx="563400" cy="805800"/>
+            <a:off x="5942134" y="2857991"/>
+            <a:ext cx="591570" cy="1146027"/>
           </a:xfrm>
           <a:prstGeom prst="rect">
             <a:avLst/>
@@ -8879,25 +8528,17 @@
           </a:ln>
         </p:spPr>
         <p:txBody>
-          <a:bodyPr spcFirstLastPara="1" wrap="square" lIns="91425" tIns="91425" rIns="91425" bIns="91425" anchor="t" anchorCtr="0">
+          <a:bodyPr spcFirstLastPara="1" wrap="square" lIns="96645" tIns="96645" rIns="96645" bIns="96645" anchor="t" anchorCtr="0">
             <a:noAutofit/>
           </a:bodyPr>
           <a:lstStyle/>
           <a:p>
-            <a:pPr marL="0" lvl="0" indent="0" algn="ctr" rtl="0">
-              <a:spcBef>
-                <a:spcPts val="0"/>
-              </a:spcBef>
-              <a:spcAft>
-                <a:spcPts val="0"/>
-              </a:spcAft>
-              <a:buNone/>
-            </a:pPr>
+            <a:pPr algn="ctr"/>
             <a:r>
-              <a:rPr lang="en" sz="3600"/>
+              <a:rPr lang="en" sz="3800"/>
               <a:t>-</a:t>
             </a:r>
-            <a:endParaRPr sz="3600"/>
+            <a:endParaRPr sz="3800"/>
           </a:p>
         </p:txBody>
       </p:sp>
@@ -8909,8 +8550,8 @@
         </p:nvSpPr>
         <p:spPr>
           <a:xfrm>
-            <a:off x="1171575" y="2944800"/>
-            <a:ext cx="563400" cy="805800"/>
+            <a:off x="1230154" y="4188160"/>
+            <a:ext cx="591570" cy="1146027"/>
           </a:xfrm>
           <a:prstGeom prst="rect">
             <a:avLst/>
@@ -8921,25 +8562,17 @@
           </a:ln>
         </p:spPr>
         <p:txBody>
-          <a:bodyPr spcFirstLastPara="1" wrap="square" lIns="91425" tIns="91425" rIns="91425" bIns="91425" anchor="t" anchorCtr="0">
+          <a:bodyPr spcFirstLastPara="1" wrap="square" lIns="96645" tIns="96645" rIns="96645" bIns="96645" anchor="t" anchorCtr="0">
             <a:noAutofit/>
           </a:bodyPr>
           <a:lstStyle/>
           <a:p>
-            <a:pPr marL="0" lvl="0" indent="0" algn="ctr" rtl="0">
-              <a:spcBef>
-                <a:spcPts val="0"/>
-              </a:spcBef>
-              <a:spcAft>
-                <a:spcPts val="0"/>
-              </a:spcAft>
-              <a:buNone/>
-            </a:pPr>
+            <a:pPr algn="ctr"/>
             <a:r>
-              <a:rPr lang="en" sz="3600"/>
+              <a:rPr lang="en" sz="3800"/>
               <a:t>+</a:t>
             </a:r>
-            <a:endParaRPr sz="3600"/>
+            <a:endParaRPr sz="3800"/>
           </a:p>
         </p:txBody>
       </p:sp>
@@ -8951,8 +8584,8 @@
         </p:nvSpPr>
         <p:spPr>
           <a:xfrm>
-            <a:off x="6125050" y="2944800"/>
-            <a:ext cx="563400" cy="805800"/>
+            <a:off x="6431303" y="4188160"/>
+            <a:ext cx="591570" cy="1146027"/>
           </a:xfrm>
           <a:prstGeom prst="rect">
             <a:avLst/>
@@ -8963,25 +8596,41 @@
           </a:ln>
         </p:spPr>
         <p:txBody>
-          <a:bodyPr spcFirstLastPara="1" wrap="square" lIns="91425" tIns="91425" rIns="91425" bIns="91425" anchor="t" anchorCtr="0">
+          <a:bodyPr spcFirstLastPara="1" wrap="square" lIns="96645" tIns="96645" rIns="96645" bIns="96645" anchor="t" anchorCtr="0">
             <a:noAutofit/>
           </a:bodyPr>
           <a:lstStyle/>
           <a:p>
-            <a:pPr marL="0" lvl="0" indent="0" algn="ctr" rtl="0">
-              <a:spcBef>
-                <a:spcPts val="0"/>
-              </a:spcBef>
-              <a:spcAft>
-                <a:spcPts val="0"/>
-              </a:spcAft>
-              <a:buNone/>
-            </a:pPr>
+            <a:pPr algn="ctr"/>
             <a:r>
-              <a:rPr lang="en" sz="3600"/>
+              <a:rPr lang="en" sz="3800"/>
               <a:t>-</a:t>
             </a:r>
-            <a:endParaRPr sz="3600"/>
+            <a:endParaRPr sz="3800"/>
+          </a:p>
+        </p:txBody>
+      </p:sp>
+      <p:sp>
+        <p:nvSpPr>
+          <p:cNvPr id="2" name="Slide Number Placeholder 1"/>
+          <p:cNvSpPr>
+            <a:spLocks noGrp="1"/>
+          </p:cNvSpPr>
+          <p:nvPr>
+            <p:ph type="sldNum" idx="12"/>
+          </p:nvPr>
+        </p:nvSpPr>
+        <p:spPr/>
+        <p:txBody>
+          <a:bodyPr/>
+          <a:lstStyle/>
+          <a:p>
+            <a:fld id="{00000000-1234-1234-1234-123412341234}" type="slidenum">
+              <a:rPr lang="en" smtClean="0"/>
+              <a:pPr/>
+              <a:t>5</a:t>
+            </a:fld>
+            <a:endParaRPr lang="en"/>
           </a:p>
         </p:txBody>
       </p:sp>
@@ -9022,28 +8671,19 @@
         </p:nvSpPr>
         <p:spPr>
           <a:xfrm>
-            <a:off x="311700" y="445025"/>
-            <a:ext cx="8520600" cy="572700"/>
+            <a:off x="327285" y="632925"/>
+            <a:ext cx="8946630" cy="814507"/>
           </a:xfrm>
           <a:prstGeom prst="rect">
             <a:avLst/>
           </a:prstGeom>
         </p:spPr>
         <p:txBody>
-          <a:bodyPr spcFirstLastPara="1" wrap="square" lIns="91425" tIns="91425" rIns="91425" bIns="91425" anchor="t" anchorCtr="0">
+          <a:bodyPr spcFirstLastPara="1" wrap="square" lIns="96645" tIns="96645" rIns="96645" bIns="96645" anchor="t" anchorCtr="0">
             <a:noAutofit/>
           </a:bodyPr>
           <a:lstStyle/>
           <a:p>
-            <a:pPr marL="0" lvl="0" indent="0">
-              <a:spcBef>
-                <a:spcPts val="0"/>
-              </a:spcBef>
-              <a:spcAft>
-                <a:spcPts val="0"/>
-              </a:spcAft>
-              <a:buNone/>
-            </a:pPr>
             <a:r>
               <a:rPr lang="en"/>
               <a:t>Example Setup</a:t>
@@ -9068,8 +8708,8 @@
         </p:blipFill>
         <p:spPr>
           <a:xfrm>
-            <a:off x="3326563" y="1330850"/>
-            <a:ext cx="2490875" cy="3324550"/>
+            <a:off x="2824317" y="1635122"/>
+            <a:ext cx="3952566" cy="4778329"/>
           </a:xfrm>
           <a:prstGeom prst="rect">
             <a:avLst/>
@@ -9080,6 +8720,30 @@
           </a:ln>
         </p:spPr>
       </p:pic>
+      <p:sp>
+        <p:nvSpPr>
+          <p:cNvPr id="2" name="Slide Number Placeholder 1"/>
+          <p:cNvSpPr>
+            <a:spLocks noGrp="1"/>
+          </p:cNvSpPr>
+          <p:nvPr>
+            <p:ph type="sldNum" idx="12"/>
+          </p:nvPr>
+        </p:nvSpPr>
+        <p:spPr/>
+        <p:txBody>
+          <a:bodyPr/>
+          <a:lstStyle/>
+          <a:p>
+            <a:fld id="{00000000-1234-1234-1234-123412341234}" type="slidenum">
+              <a:rPr lang="en" smtClean="0"/>
+              <a:pPr/>
+              <a:t>6</a:t>
+            </a:fld>
+            <a:endParaRPr lang="en"/>
+          </a:p>
+        </p:txBody>
+      </p:sp>
     </p:spTree>
   </p:cSld>
   <p:clrMapOvr>
@@ -9117,33 +8781,48 @@
         </p:nvSpPr>
         <p:spPr>
           <a:xfrm>
-            <a:off x="311700" y="2150850"/>
-            <a:ext cx="8520600" cy="841800"/>
+            <a:off x="327285" y="3058987"/>
+            <a:ext cx="8946630" cy="1197227"/>
           </a:xfrm>
           <a:prstGeom prst="rect">
             <a:avLst/>
           </a:prstGeom>
         </p:spPr>
         <p:txBody>
-          <a:bodyPr spcFirstLastPara="1" wrap="square" lIns="91425" tIns="91425" rIns="91425" bIns="91425" anchor="ctr" anchorCtr="0">
+          <a:bodyPr spcFirstLastPara="1" wrap="square" lIns="96645" tIns="96645" rIns="96645" bIns="96645" anchor="ctr" anchorCtr="0">
             <a:noAutofit/>
           </a:bodyPr>
           <a:lstStyle/>
           <a:p>
-            <a:pPr marL="0" lvl="0" indent="0">
-              <a:spcBef>
-                <a:spcPts val="0"/>
-              </a:spcBef>
-              <a:spcAft>
-                <a:spcPts val="0"/>
-              </a:spcAft>
-              <a:buNone/>
-            </a:pPr>
             <a:r>
               <a:rPr lang="en"/>
               <a:t>Appendix</a:t>
             </a:r>
             <a:endParaRPr/>
+          </a:p>
+        </p:txBody>
+      </p:sp>
+      <p:sp>
+        <p:nvSpPr>
+          <p:cNvPr id="2" name="Slide Number Placeholder 1"/>
+          <p:cNvSpPr>
+            <a:spLocks noGrp="1"/>
+          </p:cNvSpPr>
+          <p:nvPr>
+            <p:ph type="sldNum" idx="12"/>
+          </p:nvPr>
+        </p:nvSpPr>
+        <p:spPr/>
+        <p:txBody>
+          <a:bodyPr/>
+          <a:lstStyle/>
+          <a:p>
+            <a:fld id="{00000000-1234-1234-1234-123412341234}" type="slidenum">
+              <a:rPr lang="en" smtClean="0"/>
+              <a:pPr/>
+              <a:t>7</a:t>
+            </a:fld>
+            <a:endParaRPr lang="en"/>
           </a:p>
         </p:txBody>
       </p:sp>
@@ -9184,28 +8863,19 @@
         </p:nvSpPr>
         <p:spPr>
           <a:xfrm>
-            <a:off x="311700" y="445025"/>
-            <a:ext cx="8520600" cy="572700"/>
+            <a:off x="327285" y="632925"/>
+            <a:ext cx="8946630" cy="814507"/>
           </a:xfrm>
           <a:prstGeom prst="rect">
             <a:avLst/>
           </a:prstGeom>
         </p:spPr>
         <p:txBody>
-          <a:bodyPr spcFirstLastPara="1" wrap="square" lIns="91425" tIns="91425" rIns="91425" bIns="91425" anchor="t" anchorCtr="0">
+          <a:bodyPr spcFirstLastPara="1" wrap="square" lIns="96645" tIns="96645" rIns="96645" bIns="96645" anchor="t" anchorCtr="0">
             <a:noAutofit/>
           </a:bodyPr>
           <a:lstStyle/>
           <a:p>
-            <a:pPr marL="0" lvl="0" indent="0">
-              <a:spcBef>
-                <a:spcPts val="0"/>
-              </a:spcBef>
-              <a:spcAft>
-                <a:spcPts val="0"/>
-              </a:spcAft>
-              <a:buNone/>
-            </a:pPr>
             <a:r>
               <a:rPr lang="en"/>
               <a:t>Electronegativity</a:t>
@@ -9226,25 +8896,22 @@
         </p:nvSpPr>
         <p:spPr>
           <a:xfrm>
-            <a:off x="311700" y="1085100"/>
-            <a:ext cx="8520600" cy="745200"/>
+            <a:off x="327285" y="1543253"/>
+            <a:ext cx="8946630" cy="1059840"/>
           </a:xfrm>
           <a:prstGeom prst="rect">
             <a:avLst/>
           </a:prstGeom>
         </p:spPr>
         <p:txBody>
-          <a:bodyPr spcFirstLastPara="1" wrap="square" lIns="91425" tIns="91425" rIns="91425" bIns="91425" anchor="t" anchorCtr="0">
+          <a:bodyPr spcFirstLastPara="1" wrap="square" lIns="96645" tIns="96645" rIns="96645" bIns="96645" anchor="t" anchorCtr="0">
             <a:noAutofit/>
           </a:bodyPr>
           <a:lstStyle/>
           <a:p>
-            <a:pPr marL="0" lvl="0" indent="0">
-              <a:spcBef>
-                <a:spcPts val="0"/>
-              </a:spcBef>
-              <a:spcAft>
-                <a:spcPts val="1600"/>
+            <a:pPr marL="0" indent="0">
+              <a:spcAft>
+                <a:spcPts val="1691"/>
               </a:spcAft>
               <a:buNone/>
             </a:pPr>
@@ -9272,8 +8939,8 @@
         </p:blipFill>
         <p:spPr>
           <a:xfrm>
-            <a:off x="901450" y="1897663"/>
-            <a:ext cx="6858000" cy="3171825"/>
+            <a:off x="946523" y="2698899"/>
+            <a:ext cx="7200900" cy="4511040"/>
           </a:xfrm>
           <a:prstGeom prst="rect">
             <a:avLst/>
@@ -9284,6 +8951,30 @@
           </a:ln>
         </p:spPr>
       </p:pic>
+      <p:sp>
+        <p:nvSpPr>
+          <p:cNvPr id="2" name="Slide Number Placeholder 1"/>
+          <p:cNvSpPr>
+            <a:spLocks noGrp="1"/>
+          </p:cNvSpPr>
+          <p:nvPr>
+            <p:ph type="sldNum" idx="12"/>
+          </p:nvPr>
+        </p:nvSpPr>
+        <p:spPr/>
+        <p:txBody>
+          <a:bodyPr/>
+          <a:lstStyle/>
+          <a:p>
+            <a:fld id="{00000000-1234-1234-1234-123412341234}" type="slidenum">
+              <a:rPr lang="en" smtClean="0"/>
+              <a:pPr/>
+              <a:t>8</a:t>
+            </a:fld>
+            <a:endParaRPr lang="en"/>
+          </a:p>
+        </p:txBody>
+      </p:sp>
     </p:spTree>
   </p:cSld>
   <p:clrMapOvr>
@@ -9321,28 +9012,19 @@
         </p:nvSpPr>
         <p:spPr>
           <a:xfrm>
-            <a:off x="311700" y="445025"/>
-            <a:ext cx="8520600" cy="572700"/>
+            <a:off x="327285" y="632925"/>
+            <a:ext cx="8946630" cy="814507"/>
           </a:xfrm>
           <a:prstGeom prst="rect">
             <a:avLst/>
           </a:prstGeom>
         </p:spPr>
         <p:txBody>
-          <a:bodyPr spcFirstLastPara="1" wrap="square" lIns="91425" tIns="91425" rIns="91425" bIns="91425" anchor="t" anchorCtr="0">
+          <a:bodyPr spcFirstLastPara="1" wrap="square" lIns="96645" tIns="96645" rIns="96645" bIns="96645" anchor="t" anchorCtr="0">
             <a:noAutofit/>
           </a:bodyPr>
           <a:lstStyle/>
           <a:p>
-            <a:pPr marL="0" lvl="0" indent="0">
-              <a:spcBef>
-                <a:spcPts val="0"/>
-              </a:spcBef>
-              <a:spcAft>
-                <a:spcPts val="0"/>
-              </a:spcAft>
-              <a:buNone/>
-            </a:pPr>
             <a:r>
               <a:rPr lang="en"/>
               <a:t>References</a:t>
@@ -9363,29 +9045,19 @@
         </p:nvSpPr>
         <p:spPr>
           <a:xfrm>
-            <a:off x="311700" y="1152475"/>
-            <a:ext cx="8520600" cy="3416400"/>
+            <a:off x="327285" y="1639075"/>
+            <a:ext cx="8946630" cy="4858880"/>
           </a:xfrm>
           <a:prstGeom prst="rect">
             <a:avLst/>
           </a:prstGeom>
         </p:spPr>
         <p:txBody>
-          <a:bodyPr spcFirstLastPara="1" wrap="square" lIns="91425" tIns="91425" rIns="91425" bIns="91425" anchor="t" anchorCtr="0">
+          <a:bodyPr spcFirstLastPara="1" wrap="square" lIns="96645" tIns="96645" rIns="96645" bIns="96645" anchor="t" anchorCtr="0">
             <a:noAutofit/>
           </a:bodyPr>
           <a:lstStyle/>
           <a:p>
-            <a:pPr marL="457200" lvl="0" indent="-342900" rtl="0">
-              <a:spcBef>
-                <a:spcPts val="0"/>
-              </a:spcBef>
-              <a:spcAft>
-                <a:spcPts val="0"/>
-              </a:spcAft>
-              <a:buSzPts val="1800"/>
-              <a:buChar char="●"/>
-            </a:pPr>
             <a:r>
               <a:rPr lang="en"/>
               <a:t>List of elecronegativity of the elments: </a:t>
@@ -9402,16 +9074,6 @@
             <a:endParaRPr/>
           </a:p>
           <a:p>
-            <a:pPr marL="457200" lvl="0" indent="-342900" rtl="0">
-              <a:spcBef>
-                <a:spcPts val="0"/>
-              </a:spcBef>
-              <a:spcAft>
-                <a:spcPts val="0"/>
-              </a:spcAft>
-              <a:buSzPts val="1800"/>
-              <a:buChar char="●"/>
-            </a:pPr>
             <a:r>
               <a:rPr lang="en"/>
               <a:t>How batteries work</a:t>
@@ -9419,15 +9081,10 @@
             <a:endParaRPr/>
           </a:p>
           <a:p>
-            <a:pPr marL="914400" lvl="1" indent="-317500" rtl="0">
-              <a:spcBef>
-                <a:spcPts val="0"/>
-              </a:spcBef>
-              <a:spcAft>
-                <a:spcPts val="0"/>
-              </a:spcAft>
-              <a:buSzPts val="1400"/>
-              <a:buChar char="○"/>
+            <a:pPr lvl="1">
+              <a:spcBef>
+                <a:spcPts val="0"/>
+              </a:spcBef>
             </a:pPr>
             <a:r>
               <a:rPr lang="en" u="sng">
@@ -9441,15 +9098,10 @@
             <a:endParaRPr/>
           </a:p>
           <a:p>
-            <a:pPr marL="914400" lvl="1" indent="-317500" rtl="0">
-              <a:spcBef>
-                <a:spcPts val="0"/>
-              </a:spcBef>
-              <a:spcAft>
-                <a:spcPts val="0"/>
-              </a:spcAft>
-              <a:buSzPts val="1400"/>
-              <a:buChar char="○"/>
+            <a:pPr lvl="1">
+              <a:spcBef>
+                <a:spcPts val="0"/>
+              </a:spcBef>
             </a:pPr>
             <a:r>
               <a:rPr lang="en" u="sng">
@@ -9463,15 +9115,10 @@
             <a:endParaRPr/>
           </a:p>
           <a:p>
-            <a:pPr marL="914400" lvl="1" indent="-317500" rtl="0">
-              <a:spcBef>
-                <a:spcPts val="0"/>
-              </a:spcBef>
-              <a:spcAft>
-                <a:spcPts val="0"/>
-              </a:spcAft>
-              <a:buSzPts val="1400"/>
-              <a:buChar char="○"/>
+            <a:pPr lvl="1">
+              <a:spcBef>
+                <a:spcPts val="0"/>
+              </a:spcBef>
             </a:pPr>
             <a:r>
               <a:rPr lang="en" u="sng">
@@ -9485,15 +9132,10 @@
             <a:endParaRPr/>
           </a:p>
           <a:p>
-            <a:pPr marL="914400" lvl="1" indent="-317500" rtl="0">
-              <a:spcBef>
-                <a:spcPts val="0"/>
-              </a:spcBef>
-              <a:spcAft>
-                <a:spcPts val="0"/>
-              </a:spcAft>
-              <a:buSzPts val="1400"/>
-              <a:buChar char="○"/>
+            <a:pPr lvl="1">
+              <a:spcBef>
+                <a:spcPts val="0"/>
+              </a:spcBef>
             </a:pPr>
             <a:r>
               <a:rPr lang="en" u="sng">
@@ -9507,16 +9149,40 @@
             <a:endParaRPr/>
           </a:p>
           <a:p>
-            <a:pPr marL="0" lvl="0" indent="0">
-              <a:spcBef>
-                <a:spcPts val="1600"/>
-              </a:spcBef>
-              <a:spcAft>
-                <a:spcPts val="1600"/>
+            <a:pPr marL="0" indent="0">
+              <a:spcBef>
+                <a:spcPts val="1691"/>
+              </a:spcBef>
+              <a:spcAft>
+                <a:spcPts val="1691"/>
               </a:spcAft>
               <a:buNone/>
             </a:pPr>
             <a:endParaRPr/>
+          </a:p>
+        </p:txBody>
+      </p:sp>
+      <p:sp>
+        <p:nvSpPr>
+          <p:cNvPr id="2" name="Slide Number Placeholder 1"/>
+          <p:cNvSpPr>
+            <a:spLocks noGrp="1"/>
+          </p:cNvSpPr>
+          <p:nvPr>
+            <p:ph type="sldNum" idx="12"/>
+          </p:nvPr>
+        </p:nvSpPr>
+        <p:spPr/>
+        <p:txBody>
+          <a:bodyPr/>
+          <a:lstStyle/>
+          <a:p>
+            <a:fld id="{00000000-1234-1234-1234-123412341234}" type="slidenum">
+              <a:rPr lang="en" smtClean="0"/>
+              <a:pPr/>
+              <a:t>9</a:t>
+            </a:fld>
+            <a:endParaRPr lang="en"/>
           </a:p>
         </p:txBody>
       </p:sp>

</xml_diff>